<commit_message>
Updating lections with convention, goals and plan
</commit_message>
<xml_diff>
--- a/docs/ASP.NET CORE - Common Tasks - iTechArt 2018.pptx
+++ b/docs/ASP.NET CORE - Common Tasks - iTechArt 2018.pptx
@@ -8,48 +8,55 @@
     <p:sldMasterId id="2147483702" r:id="rId4"/>
   </p:sldMasterIdLst>
   <p:notesMasterIdLst>
-    <p:notesMasterId r:id="rId41"/>
+    <p:notesMasterId r:id="rId48"/>
   </p:notesMasterIdLst>
   <p:handoutMasterIdLst>
-    <p:handoutMasterId r:id="rId42"/>
+    <p:handoutMasterId r:id="rId49"/>
   </p:handoutMasterIdLst>
   <p:sldIdLst>
     <p:sldId id="334" r:id="rId5"/>
     <p:sldId id="338" r:id="rId6"/>
-    <p:sldId id="286" r:id="rId7"/>
-    <p:sldId id="545" r:id="rId8"/>
-    <p:sldId id="546" r:id="rId9"/>
-    <p:sldId id="552" r:id="rId10"/>
-    <p:sldId id="550" r:id="rId11"/>
-    <p:sldId id="549" r:id="rId12"/>
-    <p:sldId id="551" r:id="rId13"/>
-    <p:sldId id="521" r:id="rId14"/>
-    <p:sldId id="520" r:id="rId15"/>
-    <p:sldId id="553" r:id="rId16"/>
-    <p:sldId id="557" r:id="rId17"/>
-    <p:sldId id="555" r:id="rId18"/>
-    <p:sldId id="547" r:id="rId19"/>
-    <p:sldId id="558" r:id="rId20"/>
-    <p:sldId id="559" r:id="rId21"/>
-    <p:sldId id="579" r:id="rId22"/>
-    <p:sldId id="561" r:id="rId23"/>
-    <p:sldId id="562" r:id="rId24"/>
-    <p:sldId id="563" r:id="rId25"/>
-    <p:sldId id="570" r:id="rId26"/>
-    <p:sldId id="564" r:id="rId27"/>
-    <p:sldId id="565" r:id="rId28"/>
-    <p:sldId id="575" r:id="rId29"/>
-    <p:sldId id="569" r:id="rId30"/>
-    <p:sldId id="566" r:id="rId31"/>
-    <p:sldId id="567" r:id="rId32"/>
-    <p:sldId id="576" r:id="rId33"/>
-    <p:sldId id="571" r:id="rId34"/>
-    <p:sldId id="568" r:id="rId35"/>
-    <p:sldId id="572" r:id="rId36"/>
-    <p:sldId id="573" r:id="rId37"/>
-    <p:sldId id="574" r:id="rId38"/>
-    <p:sldId id="577" r:id="rId39"/>
-    <p:sldId id="578" r:id="rId40"/>
+    <p:sldId id="582" r:id="rId7"/>
+    <p:sldId id="583" r:id="rId8"/>
+    <p:sldId id="545" r:id="rId9"/>
+    <p:sldId id="546" r:id="rId10"/>
+    <p:sldId id="552" r:id="rId11"/>
+    <p:sldId id="550" r:id="rId12"/>
+    <p:sldId id="549" r:id="rId13"/>
+    <p:sldId id="551" r:id="rId14"/>
+    <p:sldId id="521" r:id="rId15"/>
+    <p:sldId id="520" r:id="rId16"/>
+    <p:sldId id="553" r:id="rId17"/>
+    <p:sldId id="557" r:id="rId18"/>
+    <p:sldId id="555" r:id="rId19"/>
+    <p:sldId id="547" r:id="rId20"/>
+    <p:sldId id="558" r:id="rId21"/>
+    <p:sldId id="584" r:id="rId22"/>
+    <p:sldId id="559" r:id="rId23"/>
+    <p:sldId id="579" r:id="rId24"/>
+    <p:sldId id="561" r:id="rId25"/>
+    <p:sldId id="562" r:id="rId26"/>
+    <p:sldId id="585" r:id="rId27"/>
+    <p:sldId id="563" r:id="rId28"/>
+    <p:sldId id="570" r:id="rId29"/>
+    <p:sldId id="564" r:id="rId30"/>
+    <p:sldId id="586" r:id="rId31"/>
+    <p:sldId id="565" r:id="rId32"/>
+    <p:sldId id="575" r:id="rId33"/>
+    <p:sldId id="569" r:id="rId34"/>
+    <p:sldId id="566" r:id="rId35"/>
+    <p:sldId id="587" r:id="rId36"/>
+    <p:sldId id="567" r:id="rId37"/>
+    <p:sldId id="576" r:id="rId38"/>
+    <p:sldId id="571" r:id="rId39"/>
+    <p:sldId id="568" r:id="rId40"/>
+    <p:sldId id="588" r:id="rId41"/>
+    <p:sldId id="572" r:id="rId42"/>
+    <p:sldId id="573" r:id="rId43"/>
+    <p:sldId id="574" r:id="rId44"/>
+    <p:sldId id="577" r:id="rId45"/>
+    <p:sldId id="589" r:id="rId46"/>
+    <p:sldId id="578" r:id="rId47"/>
   </p:sldIdLst>
   <p:sldSz cx="9144000" cy="6858000" type="screen4x3"/>
   <p:notesSz cx="6858000" cy="9144000"/>
@@ -562,7 +569,6 @@
               </a:p>
             </c:rich>
           </c:tx>
-          <c:layout/>
           <c:overlay val="0"/>
           <c:spPr>
             <a:noFill/>
@@ -1489,7 +1495,6 @@
               </a:p>
             </c:rich>
           </c:tx>
-          <c:layout/>
           <c:overlay val="0"/>
           <c:spPr>
             <a:noFill/>
@@ -3676,7 +3681,6 @@
               </a:p>
             </c:rich>
           </c:tx>
-          <c:layout/>
           <c:overlay val="0"/>
           <c:spPr>
             <a:noFill/>
@@ -3724,7 +3728,6 @@
     </c:plotArea>
     <c:legend>
       <c:legendPos val="r"/>
-      <c:layout/>
       <c:overlay val="0"/>
       <c:spPr>
         <a:noFill/>
@@ -5543,7 +5546,7 @@
           <a:p>
             <a:fld id="{4745C2A7-EC62-4025-933C-BCAFCDD3DF69}" type="datetimeFigureOut">
               <a:rPr lang="en-US" smtClean="0"/>
-              <a:t>2/15/2018</a:t>
+              <a:t>2/16/2018</a:t>
             </a:fld>
             <a:endParaRPr lang="en-US"/>
           </a:p>
@@ -5708,7 +5711,7 @@
           <a:p>
             <a:fld id="{06260018-D06A-43EF-993F-2C9FDF70442E}" type="datetimeFigureOut">
               <a:rPr lang="en-US" smtClean="0"/>
-              <a:t>2/15/2018</a:t>
+              <a:t>2/16/2018</a:t>
             </a:fld>
             <a:endParaRPr lang="en-US"/>
           </a:p>
@@ -6091,7 +6094,7 @@
           <a:p>
             <a:fld id="{90A21AFC-86E3-4DD0-9273-5E1AF32C91DB}" type="slidenum">
               <a:rPr lang="en-US" smtClean="0"/>
-              <a:t>7</a:t>
+              <a:t>8</a:t>
             </a:fld>
             <a:endParaRPr lang="en-US"/>
           </a:p>
@@ -6179,7 +6182,7 @@
           <a:p>
             <a:fld id="{90A21AFC-86E3-4DD0-9273-5E1AF32C91DB}" type="slidenum">
               <a:rPr lang="en-US" smtClean="0"/>
-              <a:t>8</a:t>
+              <a:t>9</a:t>
             </a:fld>
             <a:endParaRPr lang="en-US"/>
           </a:p>
@@ -6274,15 +6277,7 @@
             </a:pPr>
             <a:r>
               <a:rPr lang="en-US" baseline="0" dirty="0" smtClean="0"/>
-              <a:t>Some </a:t>
-            </a:r>
-            <a:r>
-              <a:rPr lang="en-US" baseline="0" dirty="0" smtClean="0"/>
-              <a:t>projects </a:t>
-            </a:r>
-            <a:r>
-              <a:rPr lang="en-US" baseline="0" dirty="0" smtClean="0"/>
-              <a:t>are good</a:t>
+              <a:t>Some projects are good</a:t>
             </a:r>
             <a:endParaRPr lang="en-US" dirty="0" smtClean="0"/>
           </a:p>
@@ -6305,7 +6300,7 @@
           <a:p>
             <a:fld id="{90A21AFC-86E3-4DD0-9273-5E1AF32C91DB}" type="slidenum">
               <a:rPr lang="en-US" smtClean="0"/>
-              <a:t>9</a:t>
+              <a:t>10</a:t>
             </a:fld>
             <a:endParaRPr lang="en-US"/>
           </a:p>
@@ -6411,7 +6406,7 @@
           <a:p>
             <a:fld id="{90A21AFC-86E3-4DD0-9273-5E1AF32C91DB}" type="slidenum">
               <a:rPr lang="en-US" smtClean="0"/>
-              <a:t>10</a:t>
+              <a:t>11</a:t>
             </a:fld>
             <a:endParaRPr lang="en-US"/>
           </a:p>
@@ -6503,7 +6498,7 @@
           <a:p>
             <a:fld id="{90A21AFC-86E3-4DD0-9273-5E1AF32C91DB}" type="slidenum">
               <a:rPr lang="en-US" smtClean="0"/>
-              <a:t>11</a:t>
+              <a:t>12</a:t>
             </a:fld>
             <a:endParaRPr lang="en-US"/>
           </a:p>
@@ -6587,7 +6582,7 @@
           <a:p>
             <a:fld id="{90A21AFC-86E3-4DD0-9273-5E1AF32C91DB}" type="slidenum">
               <a:rPr lang="en-US" smtClean="0"/>
-              <a:t>13</a:t>
+              <a:t>14</a:t>
             </a:fld>
             <a:endParaRPr lang="en-US"/>
           </a:p>
@@ -6685,7 +6680,7 @@
           <a:p>
             <a:fld id="{90A21AFC-86E3-4DD0-9273-5E1AF32C91DB}" type="slidenum">
               <a:rPr lang="en-US" smtClean="0"/>
-              <a:t>35</a:t>
+              <a:t>41</a:t>
             </a:fld>
             <a:endParaRPr lang="en-US"/>
           </a:p>
@@ -6777,7 +6772,7 @@
           <a:p>
             <a:fld id="{90A21AFC-86E3-4DD0-9273-5E1AF32C91DB}" type="slidenum">
               <a:rPr lang="en-US" smtClean="0"/>
-              <a:t>36</a:t>
+              <a:t>43</a:t>
             </a:fld>
             <a:endParaRPr lang="en-US"/>
           </a:p>
@@ -20593,112 +20588,42 @@
           <a:lstStyle/>
           <a:p>
             <a:r>
-              <a:rPr lang="en-US" dirty="0"/>
-              <a:t>IT’s ALL ABOUT architecture</a:t>
-            </a:r>
-          </a:p>
-        </p:txBody>
-      </p:sp>
-      <p:sp>
-        <p:nvSpPr>
-          <p:cNvPr id="4" name="Content Placeholder 3"/>
-          <p:cNvSpPr>
-            <a:spLocks noGrp="1"/>
-          </p:cNvSpPr>
+              <a:rPr lang="en-GB" dirty="0" smtClean="0"/>
+              <a:t>Further Development</a:t>
+            </a:r>
+            <a:endParaRPr lang="en-US" dirty="0"/>
+          </a:p>
+        </p:txBody>
+      </p:sp>
+      <p:graphicFrame>
+        <p:nvGraphicFramePr>
+          <p:cNvPr id="7" name="Content Placeholder 6"/>
+          <p:cNvGraphicFramePr>
+            <a:graphicFrameLocks noGrp="1"/>
+          </p:cNvGraphicFramePr>
           <p:nvPr>
             <p:ph sz="quarter" idx="12"/>
+            <p:extLst>
+              <p:ext uri="{D42A27DB-BD31-4B8C-83A1-F6EECF244321}">
+                <p14:modId xmlns:p14="http://schemas.microsoft.com/office/powerpoint/2010/main" val="2809844176"/>
+              </p:ext>
+            </p:extLst>
           </p:nvPr>
-        </p:nvSpPr>
-        <p:spPr/>
-        <p:txBody>
-          <a:bodyPr/>
-          <a:lstStyle/>
-          <a:p>
-            <a:pPr marL="285750" indent="-285750">
-              <a:lnSpc>
-                <a:spcPct val="150000"/>
-              </a:lnSpc>
-              <a:buFont typeface="Wingdings" panose="05000000000000000000" pitchFamily="2" charset="2"/>
-              <a:buChar char="q"/>
-            </a:pPr>
-            <a:r>
-              <a:rPr lang="en-GB" sz="2400" dirty="0" smtClean="0"/>
-              <a:t>N-tier</a:t>
-            </a:r>
-            <a:endParaRPr lang="en-GB" sz="2400" dirty="0"/>
-          </a:p>
-          <a:p>
-            <a:pPr marL="285750" indent="-285750">
-              <a:lnSpc>
-                <a:spcPct val="150000"/>
-              </a:lnSpc>
-              <a:buFont typeface="Wingdings" panose="05000000000000000000" pitchFamily="2" charset="2"/>
-              <a:buChar char="q"/>
-            </a:pPr>
-            <a:r>
-              <a:rPr lang="en-GB" sz="2400" dirty="0" err="1" smtClean="0"/>
-              <a:t>Microservices</a:t>
-            </a:r>
-            <a:endParaRPr lang="en-GB" sz="2400" dirty="0" smtClean="0"/>
-          </a:p>
-          <a:p>
-            <a:pPr marL="285750" indent="-285750">
-              <a:lnSpc>
-                <a:spcPct val="150000"/>
-              </a:lnSpc>
-              <a:buFont typeface="Wingdings" panose="05000000000000000000" pitchFamily="2" charset="2"/>
-              <a:buChar char="q"/>
-            </a:pPr>
-            <a:r>
-              <a:rPr lang="en-GB" sz="2400" dirty="0" smtClean="0"/>
-              <a:t>CQRS</a:t>
-            </a:r>
-          </a:p>
-          <a:p>
-            <a:pPr marL="285750" indent="-285750">
-              <a:lnSpc>
-                <a:spcPct val="150000"/>
-              </a:lnSpc>
-              <a:buFont typeface="Wingdings" panose="05000000000000000000" pitchFamily="2" charset="2"/>
-              <a:buChar char="q"/>
-            </a:pPr>
-            <a:r>
-              <a:rPr lang="en-GB" sz="2400" dirty="0" smtClean="0"/>
-              <a:t>Event-driven architecture</a:t>
-            </a:r>
-          </a:p>
-          <a:p>
-            <a:pPr marL="285750" indent="-285750">
-              <a:lnSpc>
-                <a:spcPct val="150000"/>
-              </a:lnSpc>
-              <a:buFont typeface="Wingdings" panose="05000000000000000000" pitchFamily="2" charset="2"/>
-              <a:buChar char="q"/>
-            </a:pPr>
-            <a:r>
-              <a:rPr lang="en-GB" sz="2400" dirty="0" smtClean="0"/>
-              <a:t>Web-queue-worker</a:t>
-            </a:r>
-          </a:p>
-          <a:p>
-            <a:pPr marL="285750" indent="-285750">
-              <a:lnSpc>
-                <a:spcPct val="150000"/>
-              </a:lnSpc>
-              <a:buFont typeface="Wingdings" panose="05000000000000000000" pitchFamily="2" charset="2"/>
-              <a:buChar char="q"/>
-            </a:pPr>
-            <a:r>
-              <a:rPr lang="en-GB" sz="2400" dirty="0" smtClean="0"/>
-              <a:t>Others</a:t>
-            </a:r>
-          </a:p>
-        </p:txBody>
-      </p:sp>
+        </p:nvGraphicFramePr>
+        <p:xfrm>
+          <a:off x="323850" y="1341438"/>
+          <a:ext cx="8496300" cy="4895850"/>
+        </p:xfrm>
+        <a:graphic>
+          <a:graphicData uri="http://schemas.openxmlformats.org/drawingml/2006/chart">
+            <c:chart xmlns:c="http://schemas.openxmlformats.org/drawingml/2006/chart" xmlns:r="http://schemas.openxmlformats.org/officeDocument/2006/relationships" r:id="rId3"/>
+          </a:graphicData>
+        </a:graphic>
+      </p:graphicFrame>
     </p:spTree>
     <p:extLst>
       <p:ext uri="{BB962C8B-B14F-4D97-AF65-F5344CB8AC3E}">
-        <p14:creationId xmlns:p14="http://schemas.microsoft.com/office/powerpoint/2010/main" val="3507619123"/>
+        <p14:creationId xmlns:p14="http://schemas.microsoft.com/office/powerpoint/2010/main" val="2745616442"/>
       </p:ext>
     </p:extLst>
   </p:cSld>
@@ -20741,12 +20666,8 @@
           <a:lstStyle/>
           <a:p>
             <a:r>
-              <a:rPr lang="en-US" dirty="0" smtClean="0"/>
-              <a:t>IT’s ALL </a:t>
-            </a:r>
-            <a:r>
               <a:rPr lang="en-US" dirty="0"/>
-              <a:t>ABOUT architecture</a:t>
+              <a:t>IT’s ALL ABOUT architecture</a:t>
             </a:r>
           </a:p>
         </p:txBody>
@@ -20766,26 +20687,6 @@
           <a:bodyPr/>
           <a:lstStyle/>
           <a:p>
-            <a:pPr marL="0" indent="0">
-              <a:buNone/>
-            </a:pPr>
-            <a:r>
-              <a:rPr lang="en-US" sz="2400" dirty="0"/>
-              <a:t>N-tier </a:t>
-            </a:r>
-            <a:r>
-              <a:rPr lang="en-US" sz="2400" dirty="0" smtClean="0"/>
-              <a:t>web architecture style:</a:t>
-            </a:r>
-            <a:endParaRPr lang="en-US" sz="2400" dirty="0"/>
-          </a:p>
-          <a:p>
-            <a:pPr marL="0" indent="0">
-              <a:buNone/>
-            </a:pPr>
-            <a:endParaRPr lang="en-US" dirty="0" smtClean="0"/>
-          </a:p>
-          <a:p>
             <a:pPr marL="285750" indent="-285750">
               <a:lnSpc>
                 <a:spcPct val="150000"/>
@@ -20794,9 +20695,10 @@
               <a:buChar char="q"/>
             </a:pPr>
             <a:r>
-              <a:rPr lang="en-US" sz="2400" dirty="0" smtClean="0"/>
-              <a:t>0 Tiers – Client has direct database access</a:t>
-            </a:r>
+              <a:rPr lang="en-GB" sz="2400" dirty="0" smtClean="0"/>
+              <a:t>N-tier</a:t>
+            </a:r>
+            <a:endParaRPr lang="en-GB" sz="2400" dirty="0"/>
           </a:p>
           <a:p>
             <a:pPr marL="285750" indent="-285750">
@@ -20807,13 +20709,10 @@
               <a:buChar char="q"/>
             </a:pPr>
             <a:r>
-              <a:rPr lang="en-US" sz="2400" dirty="0"/>
-              <a:t>1</a:t>
-            </a:r>
-            <a:r>
-              <a:rPr lang="en-US" sz="2400" dirty="0" smtClean="0"/>
-              <a:t> Tier – Web tier is added between client and database</a:t>
-            </a:r>
+              <a:rPr lang="en-GB" sz="2400" dirty="0" err="1" smtClean="0"/>
+              <a:t>Microservices</a:t>
+            </a:r>
+            <a:endParaRPr lang="en-GB" sz="2400" dirty="0" smtClean="0"/>
           </a:p>
           <a:p>
             <a:pPr marL="285750" indent="-285750">
@@ -20825,7 +20724,7 @@
             </a:pPr>
             <a:r>
               <a:rPr lang="en-GB" sz="2400" dirty="0" smtClean="0"/>
-              <a:t>2 Tiers – Data tier is added to handle database</a:t>
+              <a:t>CQRS</a:t>
             </a:r>
           </a:p>
           <a:p>
@@ -20838,9 +20737,8 @@
             </a:pPr>
             <a:r>
               <a:rPr lang="en-GB" sz="2400" dirty="0" smtClean="0"/>
-              <a:t>3 Tiers – Business tier is added to handle business logic</a:t>
-            </a:r>
-            <a:endParaRPr lang="ru-RU" sz="2400" dirty="0" smtClean="0"/>
+              <a:t>Event-driven architecture</a:t>
+            </a:r>
           </a:p>
           <a:p>
             <a:pPr marL="285750" indent="-285750">
@@ -20852,20 +20750,28 @@
             </a:pPr>
             <a:r>
               <a:rPr lang="en-GB" sz="2400" dirty="0" smtClean="0"/>
-              <a:t>4 and more </a:t>
-            </a:r>
-            <a:r>
-              <a:rPr lang="en-US" sz="2400" dirty="0" smtClean="0"/>
-              <a:t>Tiers – Specific solutions</a:t>
-            </a:r>
-            <a:endParaRPr lang="en-US" sz="2400" dirty="0"/>
+              <a:t>Web-queue-worker</a:t>
+            </a:r>
+          </a:p>
+          <a:p>
+            <a:pPr marL="285750" indent="-285750">
+              <a:lnSpc>
+                <a:spcPct val="150000"/>
+              </a:lnSpc>
+              <a:buFont typeface="Wingdings" panose="05000000000000000000" pitchFamily="2" charset="2"/>
+              <a:buChar char="q"/>
+            </a:pPr>
+            <a:r>
+              <a:rPr lang="en-GB" sz="2400" dirty="0" smtClean="0"/>
+              <a:t>Others</a:t>
+            </a:r>
           </a:p>
         </p:txBody>
       </p:sp>
     </p:spTree>
     <p:extLst>
       <p:ext uri="{BB962C8B-B14F-4D97-AF65-F5344CB8AC3E}">
-        <p14:creationId xmlns:p14="http://schemas.microsoft.com/office/powerpoint/2010/main" val="640089714"/>
+        <p14:creationId xmlns:p14="http://schemas.microsoft.com/office/powerpoint/2010/main" val="3507619123"/>
       </p:ext>
     </p:extLst>
   </p:cSld>
@@ -20894,6 +20800,173 @@
       </p:grpSpPr>
       <p:sp>
         <p:nvSpPr>
+          <p:cNvPr id="2" name="Title 1"/>
+          <p:cNvSpPr>
+            <a:spLocks noGrp="1"/>
+          </p:cNvSpPr>
+          <p:nvPr>
+            <p:ph type="title"/>
+          </p:nvPr>
+        </p:nvSpPr>
+        <p:spPr/>
+        <p:txBody>
+          <a:bodyPr/>
+          <a:lstStyle/>
+          <a:p>
+            <a:r>
+              <a:rPr lang="en-US" dirty="0" smtClean="0"/>
+              <a:t>IT’s ALL </a:t>
+            </a:r>
+            <a:r>
+              <a:rPr lang="en-US" dirty="0"/>
+              <a:t>ABOUT architecture</a:t>
+            </a:r>
+          </a:p>
+        </p:txBody>
+      </p:sp>
+      <p:sp>
+        <p:nvSpPr>
+          <p:cNvPr id="4" name="Content Placeholder 3"/>
+          <p:cNvSpPr>
+            <a:spLocks noGrp="1"/>
+          </p:cNvSpPr>
+          <p:nvPr>
+            <p:ph sz="quarter" idx="12"/>
+          </p:nvPr>
+        </p:nvSpPr>
+        <p:spPr/>
+        <p:txBody>
+          <a:bodyPr/>
+          <a:lstStyle/>
+          <a:p>
+            <a:pPr marL="0" indent="0">
+              <a:buNone/>
+            </a:pPr>
+            <a:r>
+              <a:rPr lang="en-US" sz="2400" dirty="0"/>
+              <a:t>N-tier </a:t>
+            </a:r>
+            <a:r>
+              <a:rPr lang="en-US" sz="2400" dirty="0" smtClean="0"/>
+              <a:t>web architecture style:</a:t>
+            </a:r>
+            <a:endParaRPr lang="en-US" sz="2400" dirty="0"/>
+          </a:p>
+          <a:p>
+            <a:pPr marL="0" indent="0">
+              <a:buNone/>
+            </a:pPr>
+            <a:endParaRPr lang="en-US" dirty="0" smtClean="0"/>
+          </a:p>
+          <a:p>
+            <a:pPr marL="285750" indent="-285750">
+              <a:lnSpc>
+                <a:spcPct val="150000"/>
+              </a:lnSpc>
+              <a:buFont typeface="Wingdings" panose="05000000000000000000" pitchFamily="2" charset="2"/>
+              <a:buChar char="q"/>
+            </a:pPr>
+            <a:r>
+              <a:rPr lang="en-US" sz="2400" dirty="0" smtClean="0"/>
+              <a:t>0 Tiers – Client has direct database access</a:t>
+            </a:r>
+          </a:p>
+          <a:p>
+            <a:pPr marL="285750" indent="-285750">
+              <a:lnSpc>
+                <a:spcPct val="150000"/>
+              </a:lnSpc>
+              <a:buFont typeface="Wingdings" panose="05000000000000000000" pitchFamily="2" charset="2"/>
+              <a:buChar char="q"/>
+            </a:pPr>
+            <a:r>
+              <a:rPr lang="en-US" sz="2400" dirty="0"/>
+              <a:t>1</a:t>
+            </a:r>
+            <a:r>
+              <a:rPr lang="en-US" sz="2400" dirty="0" smtClean="0"/>
+              <a:t> Tier – Web tier is added between client and database</a:t>
+            </a:r>
+          </a:p>
+          <a:p>
+            <a:pPr marL="285750" indent="-285750">
+              <a:lnSpc>
+                <a:spcPct val="150000"/>
+              </a:lnSpc>
+              <a:buFont typeface="Wingdings" panose="05000000000000000000" pitchFamily="2" charset="2"/>
+              <a:buChar char="q"/>
+            </a:pPr>
+            <a:r>
+              <a:rPr lang="en-GB" sz="2400" dirty="0" smtClean="0"/>
+              <a:t>2 Tiers – Data tier is added to handle database</a:t>
+            </a:r>
+          </a:p>
+          <a:p>
+            <a:pPr marL="285750" indent="-285750">
+              <a:lnSpc>
+                <a:spcPct val="150000"/>
+              </a:lnSpc>
+              <a:buFont typeface="Wingdings" panose="05000000000000000000" pitchFamily="2" charset="2"/>
+              <a:buChar char="q"/>
+            </a:pPr>
+            <a:r>
+              <a:rPr lang="en-GB" sz="2400" dirty="0" smtClean="0"/>
+              <a:t>3 Tiers – Business tier is added to handle business logic</a:t>
+            </a:r>
+            <a:endParaRPr lang="ru-RU" sz="2400" dirty="0" smtClean="0"/>
+          </a:p>
+          <a:p>
+            <a:pPr marL="285750" indent="-285750">
+              <a:lnSpc>
+                <a:spcPct val="150000"/>
+              </a:lnSpc>
+              <a:buFont typeface="Wingdings" panose="05000000000000000000" pitchFamily="2" charset="2"/>
+              <a:buChar char="q"/>
+            </a:pPr>
+            <a:r>
+              <a:rPr lang="en-GB" sz="2400" dirty="0" smtClean="0"/>
+              <a:t>4 and more </a:t>
+            </a:r>
+            <a:r>
+              <a:rPr lang="en-US" sz="2400" dirty="0" smtClean="0"/>
+              <a:t>Tiers – Specific solutions</a:t>
+            </a:r>
+            <a:endParaRPr lang="en-US" sz="2400" dirty="0"/>
+          </a:p>
+        </p:txBody>
+      </p:sp>
+    </p:spTree>
+    <p:extLst>
+      <p:ext uri="{BB962C8B-B14F-4D97-AF65-F5344CB8AC3E}">
+        <p14:creationId xmlns:p14="http://schemas.microsoft.com/office/powerpoint/2010/main" val="640089714"/>
+      </p:ext>
+    </p:extLst>
+  </p:cSld>
+  <p:clrMapOvr>
+    <a:masterClrMapping/>
+  </p:clrMapOvr>
+</p:sld>
+</file>
+
+<file path=ppt/slides/slide13.xml><?xml version="1.0" encoding="utf-8"?>
+<p:sld xmlns:a="http://schemas.openxmlformats.org/drawingml/2006/main" xmlns:r="http://schemas.openxmlformats.org/officeDocument/2006/relationships" xmlns:p="http://schemas.openxmlformats.org/presentationml/2006/main">
+  <p:cSld>
+    <p:spTree>
+      <p:nvGrpSpPr>
+        <p:cNvPr id="1" name=""/>
+        <p:cNvGrpSpPr/>
+        <p:nvPr/>
+      </p:nvGrpSpPr>
+      <p:grpSpPr>
+        <a:xfrm>
+          <a:off x="0" y="0"/>
+          <a:ext cx="0" cy="0"/>
+          <a:chOff x="0" y="0"/>
+          <a:chExt cx="0" cy="0"/>
+        </a:xfrm>
+      </p:grpSpPr>
+      <p:sp>
+        <p:nvSpPr>
           <p:cNvPr id="2" name="Text Placeholder 1"/>
           <p:cNvSpPr>
             <a:spLocks noGrp="1"/>
@@ -20951,7 +21024,7 @@
 </p:sld>
 </file>
 
-<file path=ppt/slides/slide13.xml><?xml version="1.0" encoding="utf-8"?>
+<file path=ppt/slides/slide14.xml><?xml version="1.0" encoding="utf-8"?>
 <p:sld xmlns:a="http://schemas.openxmlformats.org/drawingml/2006/main" xmlns:r="http://schemas.openxmlformats.org/officeDocument/2006/relationships" xmlns:p="http://schemas.openxmlformats.org/presentationml/2006/main">
   <p:cSld>
     <p:spTree>
@@ -21341,141 +21414,6 @@
 </p:sld>
 </file>
 
-<file path=ppt/slides/slide14.xml><?xml version="1.0" encoding="utf-8"?>
-<p:sld xmlns:a="http://schemas.openxmlformats.org/drawingml/2006/main" xmlns:r="http://schemas.openxmlformats.org/officeDocument/2006/relationships" xmlns:p="http://schemas.openxmlformats.org/presentationml/2006/main">
-  <p:cSld>
-    <p:spTree>
-      <p:nvGrpSpPr>
-        <p:cNvPr id="1" name=""/>
-        <p:cNvGrpSpPr/>
-        <p:nvPr/>
-      </p:nvGrpSpPr>
-      <p:grpSpPr>
-        <a:xfrm>
-          <a:off x="0" y="0"/>
-          <a:ext cx="0" cy="0"/>
-          <a:chOff x="0" y="0"/>
-          <a:chExt cx="0" cy="0"/>
-        </a:xfrm>
-      </p:grpSpPr>
-      <p:sp>
-        <p:nvSpPr>
-          <p:cNvPr id="2" name="Title 1"/>
-          <p:cNvSpPr>
-            <a:spLocks noGrp="1"/>
-          </p:cNvSpPr>
-          <p:nvPr>
-            <p:ph type="title"/>
-          </p:nvPr>
-        </p:nvSpPr>
-        <p:spPr/>
-        <p:txBody>
-          <a:bodyPr/>
-          <a:lstStyle/>
-          <a:p>
-            <a:r>
-              <a:rPr lang="en-US" dirty="0" smtClean="0"/>
-              <a:t>Problems</a:t>
-            </a:r>
-            <a:endParaRPr lang="en-US" dirty="0"/>
-          </a:p>
-        </p:txBody>
-      </p:sp>
-      <p:sp>
-        <p:nvSpPr>
-          <p:cNvPr id="4" name="Content Placeholder 3"/>
-          <p:cNvSpPr>
-            <a:spLocks noGrp="1"/>
-          </p:cNvSpPr>
-          <p:nvPr>
-            <p:ph sz="quarter" idx="12"/>
-          </p:nvPr>
-        </p:nvSpPr>
-        <p:spPr/>
-        <p:txBody>
-          <a:bodyPr/>
-          <a:lstStyle/>
-          <a:p>
-            <a:pPr marL="342900" indent="-342900">
-              <a:lnSpc>
-                <a:spcPct val="150000"/>
-              </a:lnSpc>
-              <a:buFont typeface="Wingdings" panose="05000000000000000000" pitchFamily="2" charset="2"/>
-              <a:buChar char="q"/>
-            </a:pPr>
-            <a:r>
-              <a:rPr lang="en-US" sz="2400" dirty="0" smtClean="0"/>
-              <a:t>A lot of manually written SQL</a:t>
-            </a:r>
-          </a:p>
-          <a:p>
-            <a:pPr marL="342900" indent="-342900">
-              <a:lnSpc>
-                <a:spcPct val="150000"/>
-              </a:lnSpc>
-              <a:buFont typeface="Wingdings" panose="05000000000000000000" pitchFamily="2" charset="2"/>
-              <a:buChar char="q"/>
-            </a:pPr>
-            <a:r>
-              <a:rPr lang="en-US" sz="2400" dirty="0" smtClean="0"/>
-              <a:t>Source control</a:t>
-            </a:r>
-          </a:p>
-          <a:p>
-            <a:pPr marL="342900" indent="-342900">
-              <a:lnSpc>
-                <a:spcPct val="150000"/>
-              </a:lnSpc>
-              <a:buFont typeface="Wingdings" panose="05000000000000000000" pitchFamily="2" charset="2"/>
-              <a:buChar char="q"/>
-            </a:pPr>
-            <a:r>
-              <a:rPr lang="en-US" sz="2400" dirty="0" smtClean="0"/>
-              <a:t>Mapping to models</a:t>
-            </a:r>
-          </a:p>
-          <a:p>
-            <a:pPr marL="342900" indent="-342900">
-              <a:lnSpc>
-                <a:spcPct val="150000"/>
-              </a:lnSpc>
-              <a:buFont typeface="Wingdings" panose="05000000000000000000" pitchFamily="2" charset="2"/>
-              <a:buChar char="q"/>
-            </a:pPr>
-            <a:r>
-              <a:rPr lang="en-US" sz="2400" dirty="0" smtClean="0"/>
-              <a:t>Code duplication</a:t>
-            </a:r>
-          </a:p>
-          <a:p>
-            <a:pPr marL="342900" indent="-342900">
-              <a:lnSpc>
-                <a:spcPct val="150000"/>
-              </a:lnSpc>
-              <a:buFont typeface="Wingdings" panose="05000000000000000000" pitchFamily="2" charset="2"/>
-              <a:buChar char="q"/>
-            </a:pPr>
-            <a:r>
-              <a:rPr lang="en-GB" sz="2400" dirty="0" smtClean="0"/>
-              <a:t>What about NoSQL database?</a:t>
-            </a:r>
-            <a:endParaRPr lang="en-US" sz="2400" dirty="0" smtClean="0"/>
-          </a:p>
-        </p:txBody>
-      </p:sp>
-    </p:spTree>
-    <p:extLst>
-      <p:ext uri="{BB962C8B-B14F-4D97-AF65-F5344CB8AC3E}">
-        <p14:creationId xmlns:p14="http://schemas.microsoft.com/office/powerpoint/2010/main" val="1124609342"/>
-      </p:ext>
-    </p:extLst>
-  </p:cSld>
-  <p:clrMapOvr>
-    <a:masterClrMapping/>
-  </p:clrMapOvr>
-</p:sld>
-</file>
-
 <file path=ppt/slides/slide15.xml><?xml version="1.0" encoding="utf-8"?>
 <p:sld xmlns:a="http://schemas.openxmlformats.org/drawingml/2006/main" xmlns:r="http://schemas.openxmlformats.org/officeDocument/2006/relationships" xmlns:p="http://schemas.openxmlformats.org/presentationml/2006/main">
   <p:cSld>
@@ -21509,8 +21447,8 @@
           <a:lstStyle/>
           <a:p>
             <a:r>
-              <a:rPr lang="en-GB" dirty="0" smtClean="0"/>
-              <a:t>ORM</a:t>
+              <a:rPr lang="en-US" dirty="0" smtClean="0"/>
+              <a:t>Problems</a:t>
             </a:r>
             <a:endParaRPr lang="en-US" dirty="0"/>
           </a:p>
@@ -21539,12 +21477,8 @@
               <a:buChar char="q"/>
             </a:pPr>
             <a:r>
-              <a:rPr lang="en-US" sz="2400" dirty="0"/>
-              <a:t>Entity </a:t>
-            </a:r>
-            <a:r>
               <a:rPr lang="en-US" sz="2400" dirty="0" smtClean="0"/>
-              <a:t>Framework</a:t>
+              <a:t>A lot of manually written SQL</a:t>
             </a:r>
           </a:p>
           <a:p>
@@ -21557,7 +21491,7 @@
             </a:pPr>
             <a:r>
               <a:rPr lang="en-US" sz="2400" dirty="0" smtClean="0"/>
-              <a:t>Dapper</a:t>
+              <a:t>Source control</a:t>
             </a:r>
           </a:p>
           <a:p>
@@ -21570,7 +21504,7 @@
             </a:pPr>
             <a:r>
               <a:rPr lang="en-US" sz="2400" dirty="0" smtClean="0"/>
-              <a:t>NHibernate</a:t>
+              <a:t>Mapping to models</a:t>
             </a:r>
           </a:p>
           <a:p>
@@ -21582,10 +21516,9 @@
               <a:buChar char="q"/>
             </a:pPr>
             <a:r>
-              <a:rPr lang="en-US" sz="2400" dirty="0" err="1" smtClean="0"/>
-              <a:t>ServiceStack.OrmLite</a:t>
-            </a:r>
-            <a:endParaRPr lang="en-US" sz="2400" dirty="0"/>
+              <a:rPr lang="en-US" sz="2400" dirty="0" smtClean="0"/>
+              <a:t>Code duplication</a:t>
+            </a:r>
           </a:p>
           <a:p>
             <a:pPr marL="342900" indent="-342900">
@@ -21597,29 +21530,16 @@
             </a:pPr>
             <a:r>
               <a:rPr lang="en-GB" sz="2400" dirty="0" smtClean="0"/>
-              <a:t>Linq2DB</a:t>
-            </a:r>
-          </a:p>
-          <a:p>
-            <a:pPr marL="342900" indent="-342900">
-              <a:lnSpc>
-                <a:spcPct val="150000"/>
-              </a:lnSpc>
-              <a:buFont typeface="Wingdings" panose="05000000000000000000" pitchFamily="2" charset="2"/>
-              <a:buChar char="q"/>
-            </a:pPr>
-            <a:r>
-              <a:rPr lang="en-GB" sz="2400" dirty="0" smtClean="0"/>
-              <a:t>Others</a:t>
-            </a:r>
-            <a:endParaRPr lang="en-US" sz="2400" dirty="0"/>
+              <a:t>What about NoSQL database?</a:t>
+            </a:r>
+            <a:endParaRPr lang="en-US" sz="2400" dirty="0" smtClean="0"/>
           </a:p>
         </p:txBody>
       </p:sp>
     </p:spTree>
     <p:extLst>
       <p:ext uri="{BB962C8B-B14F-4D97-AF65-F5344CB8AC3E}">
-        <p14:creationId xmlns:p14="http://schemas.microsoft.com/office/powerpoint/2010/main" val="880215748"/>
+        <p14:creationId xmlns:p14="http://schemas.microsoft.com/office/powerpoint/2010/main" val="1124609342"/>
       </p:ext>
     </p:extLst>
   </p:cSld>
@@ -21648,12 +21568,12 @@
       </p:grpSpPr>
       <p:sp>
         <p:nvSpPr>
-          <p:cNvPr id="2" name="Text Placeholder 1"/>
+          <p:cNvPr id="2" name="Title 1"/>
           <p:cNvSpPr>
             <a:spLocks noGrp="1"/>
           </p:cNvSpPr>
           <p:nvPr>
-            <p:ph type="body" sz="quarter" idx="11"/>
+            <p:ph type="title"/>
           </p:nvPr>
         </p:nvSpPr>
         <p:spPr/>
@@ -21663,7 +21583,7 @@
           <a:p>
             <a:r>
               <a:rPr lang="en-GB" dirty="0" smtClean="0"/>
-              <a:t>DEMO</a:t>
+              <a:t>ORM</a:t>
             </a:r>
             <a:endParaRPr lang="en-US" dirty="0"/>
           </a:p>
@@ -21671,12 +21591,12 @@
       </p:sp>
       <p:sp>
         <p:nvSpPr>
-          <p:cNvPr id="3" name="Text Placeholder 2"/>
+          <p:cNvPr id="4" name="Content Placeholder 3"/>
           <p:cNvSpPr>
             <a:spLocks noGrp="1"/>
           </p:cNvSpPr>
           <p:nvPr>
-            <p:ph type="body" sz="quarter" idx="12"/>
+            <p:ph sz="quarter" idx="12"/>
           </p:nvPr>
         </p:nvSpPr>
         <p:spPr/>
@@ -21684,18 +21604,95 @@
           <a:bodyPr/>
           <a:lstStyle/>
           <a:p>
-            <a:r>
-              <a:rPr lang="en-US" dirty="0" smtClean="0"/>
-              <a:t>3 tier architecture and ORM</a:t>
-            </a:r>
-            <a:endParaRPr lang="en-US" dirty="0"/>
+            <a:pPr marL="342900" indent="-342900">
+              <a:lnSpc>
+                <a:spcPct val="150000"/>
+              </a:lnSpc>
+              <a:buFont typeface="Wingdings" panose="05000000000000000000" pitchFamily="2" charset="2"/>
+              <a:buChar char="q"/>
+            </a:pPr>
+            <a:r>
+              <a:rPr lang="en-US" sz="2400" dirty="0"/>
+              <a:t>Entity </a:t>
+            </a:r>
+            <a:r>
+              <a:rPr lang="en-US" sz="2400" dirty="0" smtClean="0"/>
+              <a:t>Framework</a:t>
+            </a:r>
+          </a:p>
+          <a:p>
+            <a:pPr marL="342900" indent="-342900">
+              <a:lnSpc>
+                <a:spcPct val="150000"/>
+              </a:lnSpc>
+              <a:buFont typeface="Wingdings" panose="05000000000000000000" pitchFamily="2" charset="2"/>
+              <a:buChar char="q"/>
+            </a:pPr>
+            <a:r>
+              <a:rPr lang="en-US" sz="2400" dirty="0" smtClean="0"/>
+              <a:t>Dapper</a:t>
+            </a:r>
+          </a:p>
+          <a:p>
+            <a:pPr marL="342900" indent="-342900">
+              <a:lnSpc>
+                <a:spcPct val="150000"/>
+              </a:lnSpc>
+              <a:buFont typeface="Wingdings" panose="05000000000000000000" pitchFamily="2" charset="2"/>
+              <a:buChar char="q"/>
+            </a:pPr>
+            <a:r>
+              <a:rPr lang="en-US" sz="2400" dirty="0" smtClean="0"/>
+              <a:t>NHibernate</a:t>
+            </a:r>
+          </a:p>
+          <a:p>
+            <a:pPr marL="342900" indent="-342900">
+              <a:lnSpc>
+                <a:spcPct val="150000"/>
+              </a:lnSpc>
+              <a:buFont typeface="Wingdings" panose="05000000000000000000" pitchFamily="2" charset="2"/>
+              <a:buChar char="q"/>
+            </a:pPr>
+            <a:r>
+              <a:rPr lang="en-US" sz="2400" dirty="0" err="1" smtClean="0"/>
+              <a:t>ServiceStack.OrmLite</a:t>
+            </a:r>
+            <a:endParaRPr lang="en-US" sz="2400" dirty="0"/>
+          </a:p>
+          <a:p>
+            <a:pPr marL="342900" indent="-342900">
+              <a:lnSpc>
+                <a:spcPct val="150000"/>
+              </a:lnSpc>
+              <a:buFont typeface="Wingdings" panose="05000000000000000000" pitchFamily="2" charset="2"/>
+              <a:buChar char="q"/>
+            </a:pPr>
+            <a:r>
+              <a:rPr lang="en-GB" sz="2400" dirty="0" smtClean="0"/>
+              <a:t>Linq2DB</a:t>
+            </a:r>
+          </a:p>
+          <a:p>
+            <a:pPr marL="342900" indent="-342900">
+              <a:lnSpc>
+                <a:spcPct val="150000"/>
+              </a:lnSpc>
+              <a:buFont typeface="Wingdings" panose="05000000000000000000" pitchFamily="2" charset="2"/>
+              <a:buChar char="q"/>
+            </a:pPr>
+            <a:r>
+              <a:rPr lang="en-GB" sz="2400" dirty="0" smtClean="0"/>
+              <a:t>Others</a:t>
+            </a:r>
+            <a:endParaRPr lang="en-US" sz="2400" dirty="0"/>
           </a:p>
         </p:txBody>
       </p:sp>
     </p:spTree>
     <p:extLst>
       <p:ext uri="{BB962C8B-B14F-4D97-AF65-F5344CB8AC3E}">
-        <p14:creationId xmlns:p14="http://schemas.microsoft.com/office/powerpoint/2010/main" val="2741100428"/>
+        <p14:creationId xmlns:p14="http://schemas.microsoft.com/office/powerpoint/2010/main" val="880215748"/>
       </p:ext>
     </p:extLst>
   </p:cSld>
@@ -21738,10 +21735,10 @@
           <a:lstStyle/>
           <a:p>
             <a:r>
-              <a:rPr lang="en-US" sz="4400" dirty="0" smtClean="0"/>
-              <a:t>Jobs</a:t>
-            </a:r>
-            <a:endParaRPr lang="en-US" sz="4400" dirty="0"/>
+              <a:rPr lang="en-GB" dirty="0" smtClean="0"/>
+              <a:t>DEMO</a:t>
+            </a:r>
+            <a:endParaRPr lang="en-US" dirty="0"/>
           </a:p>
         </p:txBody>
       </p:sp>
@@ -21761,8 +21758,8 @@
           <a:lstStyle/>
           <a:p>
             <a:r>
-              <a:rPr lang="en-GB" dirty="0" smtClean="0"/>
-              <a:t>How to add it?</a:t>
+              <a:rPr lang="en-US" dirty="0" smtClean="0"/>
+              <a:t>3 tier architecture and ORM</a:t>
             </a:r>
             <a:endParaRPr lang="en-US" dirty="0"/>
           </a:p>
@@ -21771,7 +21768,7 @@
     </p:spTree>
     <p:extLst>
       <p:ext uri="{BB962C8B-B14F-4D97-AF65-F5344CB8AC3E}">
-        <p14:creationId xmlns:p14="http://schemas.microsoft.com/office/powerpoint/2010/main" val="1008115369"/>
+        <p14:creationId xmlns:p14="http://schemas.microsoft.com/office/powerpoint/2010/main" val="2741100428"/>
       </p:ext>
     </p:extLst>
   </p:cSld>
@@ -21800,34 +21797,40 @@
       </p:grpSpPr>
       <p:sp>
         <p:nvSpPr>
-          <p:cNvPr id="4" name="Title 3"/>
+          <p:cNvPr id="2" name="Text Placeholder 1"/>
           <p:cNvSpPr>
             <a:spLocks noGrp="1"/>
           </p:cNvSpPr>
           <p:nvPr>
-            <p:ph type="title"/>
+            <p:ph type="body" sz="quarter" idx="11"/>
           </p:nvPr>
         </p:nvSpPr>
-        <p:spPr/>
+        <p:spPr>
+          <a:xfrm>
+            <a:off x="539552" y="3429000"/>
+            <a:ext cx="3888432" cy="2160240"/>
+          </a:xfrm>
+        </p:spPr>
         <p:txBody>
           <a:bodyPr/>
           <a:lstStyle/>
           <a:p>
             <a:r>
-              <a:rPr lang="en-US" dirty="0"/>
-              <a:t>COMMON Problems</a:t>
-            </a:r>
-          </a:p>
-        </p:txBody>
-      </p:sp>
-      <p:sp>
-        <p:nvSpPr>
-          <p:cNvPr id="5" name="Content Placeholder 4"/>
+              <a:rPr lang="en-US" dirty="0" smtClean="0"/>
+              <a:t>Questions</a:t>
+            </a:r>
+            <a:endParaRPr lang="en-US" dirty="0"/>
+          </a:p>
+        </p:txBody>
+      </p:sp>
+      <p:sp>
+        <p:nvSpPr>
+          <p:cNvPr id="3" name="Text Placeholder 2"/>
           <p:cNvSpPr>
             <a:spLocks noGrp="1"/>
           </p:cNvSpPr>
           <p:nvPr>
-            <p:ph sz="quarter" idx="12"/>
+            <p:ph type="body" sz="quarter" idx="12"/>
           </p:nvPr>
         </p:nvSpPr>
         <p:spPr/>
@@ -21835,88 +21838,31 @@
           <a:bodyPr/>
           <a:lstStyle/>
           <a:p>
-            <a:pPr marL="285750" indent="-285750">
-              <a:lnSpc>
-                <a:spcPct val="150000"/>
-              </a:lnSpc>
-              <a:buFont typeface="Wingdings" panose="05000000000000000000" pitchFamily="2" charset="2"/>
-              <a:buChar char="q"/>
-            </a:pPr>
-            <a:r>
-              <a:rPr lang="en-GB" sz="2400" dirty="0" smtClean="0"/>
-              <a:t>Asynchronous long running tasks</a:t>
-            </a:r>
-          </a:p>
-          <a:p>
-            <a:pPr marL="285750" indent="-285750">
-              <a:lnSpc>
-                <a:spcPct val="150000"/>
-              </a:lnSpc>
-              <a:buFont typeface="Wingdings" panose="05000000000000000000" pitchFamily="2" charset="2"/>
-              <a:buChar char="q"/>
-            </a:pPr>
-            <a:r>
-              <a:rPr lang="en-GB" sz="2400" dirty="0" smtClean="0"/>
-              <a:t>Information about tasks results</a:t>
-            </a:r>
-          </a:p>
-          <a:p>
-            <a:pPr marL="285750" indent="-285750">
-              <a:lnSpc>
-                <a:spcPct val="150000"/>
-              </a:lnSpc>
-              <a:buFont typeface="Wingdings" panose="05000000000000000000" pitchFamily="2" charset="2"/>
-              <a:buChar char="q"/>
-            </a:pPr>
-            <a:r>
-              <a:rPr lang="en-GB" sz="2400" dirty="0" smtClean="0"/>
-              <a:t>Tasks retry</a:t>
-            </a:r>
-          </a:p>
-          <a:p>
-            <a:pPr marL="285750" indent="-285750">
-              <a:lnSpc>
-                <a:spcPct val="150000"/>
-              </a:lnSpc>
-              <a:buFont typeface="Wingdings" panose="05000000000000000000" pitchFamily="2" charset="2"/>
-              <a:buChar char="q"/>
-            </a:pPr>
-            <a:r>
-              <a:rPr lang="en-GB" sz="2400" dirty="0" smtClean="0"/>
-              <a:t>Custom tasks schedule </a:t>
-            </a:r>
-          </a:p>
-          <a:p>
-            <a:pPr marL="285750" indent="-285750">
-              <a:lnSpc>
-                <a:spcPct val="150000"/>
-              </a:lnSpc>
-              <a:buFont typeface="Wingdings" panose="05000000000000000000" pitchFamily="2" charset="2"/>
-              <a:buChar char="q"/>
-            </a:pPr>
-            <a:r>
-              <a:rPr lang="en-GB" sz="2400" dirty="0" smtClean="0"/>
-              <a:t>Using same business logic</a:t>
-            </a:r>
-          </a:p>
-          <a:p>
-            <a:pPr marL="0" indent="0">
-              <a:buNone/>
-            </a:pPr>
-            <a:endParaRPr lang="en-US" sz="1600" dirty="0"/>
+            <a:r>
+              <a:rPr lang="en-US" dirty="0" smtClean="0"/>
+              <a:t>Feel free to ask anything</a:t>
+            </a:r>
+            <a:endParaRPr lang="en-US" dirty="0"/>
           </a:p>
         </p:txBody>
       </p:sp>
     </p:spTree>
     <p:extLst>
       <p:ext uri="{BB962C8B-B14F-4D97-AF65-F5344CB8AC3E}">
-        <p14:creationId xmlns:p14="http://schemas.microsoft.com/office/powerpoint/2010/main" val="3423468132"/>
+        <p14:creationId xmlns:p14="http://schemas.microsoft.com/office/powerpoint/2010/main" val="2216362403"/>
       </p:ext>
     </p:extLst>
   </p:cSld>
   <p:clrMapOvr>
     <a:masterClrMapping/>
   </p:clrMapOvr>
+  <p:timing>
+    <p:tnLst>
+      <p:par>
+        <p:cTn id="1" dur="indefinite" restart="never" nodeType="tmRoot"/>
+      </p:par>
+    </p:tnLst>
+  </p:timing>
 </p:sld>
 </file>
 
@@ -21939,12 +21885,12 @@
       </p:grpSpPr>
       <p:sp>
         <p:nvSpPr>
-          <p:cNvPr id="2" name="Title 1"/>
+          <p:cNvPr id="2" name="Text Placeholder 1"/>
           <p:cNvSpPr>
             <a:spLocks noGrp="1"/>
           </p:cNvSpPr>
           <p:nvPr>
-            <p:ph type="title"/>
+            <p:ph type="body" sz="quarter" idx="11"/>
           </p:nvPr>
         </p:nvSpPr>
         <p:spPr/>
@@ -21953,21 +21899,21 @@
           <a:lstStyle/>
           <a:p>
             <a:r>
-              <a:rPr lang="en-US" b="1" dirty="0" smtClean="0"/>
-              <a:t>Scheduling JOBS</a:t>
-            </a:r>
-            <a:endParaRPr lang="en-US" dirty="0"/>
-          </a:p>
-        </p:txBody>
-      </p:sp>
-      <p:sp>
-        <p:nvSpPr>
-          <p:cNvPr id="4" name="Content Placeholder 3"/>
+              <a:rPr lang="en-US" sz="4400" dirty="0" smtClean="0"/>
+              <a:t>Jobs</a:t>
+            </a:r>
+            <a:endParaRPr lang="en-US" sz="4400" dirty="0"/>
+          </a:p>
+        </p:txBody>
+      </p:sp>
+      <p:sp>
+        <p:nvSpPr>
+          <p:cNvPr id="3" name="Text Placeholder 2"/>
           <p:cNvSpPr>
             <a:spLocks noGrp="1"/>
           </p:cNvSpPr>
           <p:nvPr>
-            <p:ph sz="quarter" idx="12"/>
+            <p:ph type="body" sz="quarter" idx="12"/>
           </p:nvPr>
         </p:nvSpPr>
         <p:spPr/>
@@ -21975,104 +21921,18 @@
           <a:bodyPr/>
           <a:lstStyle/>
           <a:p>
-            <a:pPr marL="342900" indent="-342900">
-              <a:lnSpc>
-                <a:spcPct val="150000"/>
-              </a:lnSpc>
-              <a:buFont typeface="Wingdings" panose="05000000000000000000" pitchFamily="2" charset="2"/>
-              <a:buChar char="q"/>
-            </a:pPr>
-            <a:r>
-              <a:rPr lang="en-US" sz="2400" dirty="0" smtClean="0"/>
-              <a:t>FluentScheduler</a:t>
-            </a:r>
-            <a:endParaRPr lang="en-US" sz="2400" dirty="0"/>
-          </a:p>
-          <a:p>
-            <a:pPr marL="342900" indent="-342900">
-              <a:lnSpc>
-                <a:spcPct val="150000"/>
-              </a:lnSpc>
-              <a:buFont typeface="Wingdings" panose="05000000000000000000" pitchFamily="2" charset="2"/>
-              <a:buChar char="q"/>
-            </a:pPr>
-            <a:r>
-              <a:rPr lang="en-US" sz="2400" dirty="0" smtClean="0"/>
-              <a:t>Ncrontab</a:t>
-            </a:r>
-          </a:p>
-          <a:p>
-            <a:pPr marL="342900" indent="-342900">
-              <a:lnSpc>
-                <a:spcPct val="150000"/>
-              </a:lnSpc>
-              <a:buFont typeface="Wingdings" panose="05000000000000000000" pitchFamily="2" charset="2"/>
-              <a:buChar char="q"/>
-            </a:pPr>
-            <a:r>
-              <a:rPr lang="en-US" sz="2400" dirty="0" smtClean="0"/>
-              <a:t>QuartzNet</a:t>
-            </a:r>
-          </a:p>
-          <a:p>
-            <a:pPr marL="342900" indent="-342900">
-              <a:lnSpc>
-                <a:spcPct val="150000"/>
-              </a:lnSpc>
-              <a:buFont typeface="Wingdings" panose="05000000000000000000" pitchFamily="2" charset="2"/>
-              <a:buChar char="q"/>
-            </a:pPr>
-            <a:r>
-              <a:rPr lang="en-US" sz="2400" dirty="0" smtClean="0"/>
-              <a:t>Hangfire</a:t>
-            </a:r>
-          </a:p>
-          <a:p>
-            <a:pPr marL="342900" indent="-342900">
-              <a:lnSpc>
-                <a:spcPct val="150000"/>
-              </a:lnSpc>
-              <a:buFont typeface="Wingdings" panose="05000000000000000000" pitchFamily="2" charset="2"/>
-              <a:buChar char="q"/>
-            </a:pPr>
-            <a:r>
-              <a:rPr lang="en-US" sz="2400" dirty="0" smtClean="0"/>
-              <a:t>Chroniton</a:t>
-            </a:r>
-          </a:p>
-          <a:p>
-            <a:pPr marL="342900" indent="-342900">
-              <a:lnSpc>
-                <a:spcPct val="150000"/>
-              </a:lnSpc>
-              <a:buFont typeface="Wingdings" panose="05000000000000000000" pitchFamily="2" charset="2"/>
-              <a:buChar char="q"/>
-            </a:pPr>
-            <a:r>
-              <a:rPr lang="en-US" sz="2400" dirty="0" smtClean="0"/>
-              <a:t>DurableTask</a:t>
-            </a:r>
-          </a:p>
-          <a:p>
-            <a:pPr marL="342900" indent="-342900">
-              <a:lnSpc>
-                <a:spcPct val="150000"/>
-              </a:lnSpc>
-              <a:buFont typeface="Wingdings" panose="05000000000000000000" pitchFamily="2" charset="2"/>
-              <a:buChar char="q"/>
-            </a:pPr>
-            <a:r>
-              <a:rPr lang="en-GB" sz="2400" dirty="0" smtClean="0"/>
-              <a:t>Others</a:t>
-            </a:r>
-            <a:endParaRPr lang="en-US" sz="2400" dirty="0"/>
+            <a:r>
+              <a:rPr lang="en-GB" dirty="0" smtClean="0"/>
+              <a:t>How to add it?</a:t>
+            </a:r>
+            <a:endParaRPr lang="en-US" dirty="0"/>
           </a:p>
         </p:txBody>
       </p:sp>
     </p:spTree>
     <p:extLst>
       <p:ext uri="{BB962C8B-B14F-4D97-AF65-F5344CB8AC3E}">
-        <p14:creationId xmlns:p14="http://schemas.microsoft.com/office/powerpoint/2010/main" val="2336234496"/>
+        <p14:creationId xmlns:p14="http://schemas.microsoft.com/office/powerpoint/2010/main" val="1008115369"/>
       </p:ext>
     </p:extLst>
   </p:cSld>
@@ -22167,15 +22027,23 @@
             <a:endParaRPr lang="en-US" dirty="0"/>
           </a:p>
           <a:p>
-            <a:pPr lvl="0"/>
             <a:r>
               <a:rPr lang="en-US" dirty="0"/>
               <a:t>Technologies: </a:t>
             </a:r>
             <a:r>
               <a:rPr lang="en-US" dirty="0" smtClean="0"/>
-              <a:t>.NET, JS, HTML, CSS, SQL </a:t>
-            </a:r>
+              <a:t>.NET, JS, HTML, CSS, </a:t>
+            </a:r>
+            <a:r>
+              <a:rPr lang="en-US" dirty="0"/>
+              <a:t>SQL, </a:t>
+            </a:r>
+            <a:r>
+              <a:rPr lang="en-US" dirty="0" smtClean="0"/>
+              <a:t>Memes</a:t>
+            </a:r>
+            <a:endParaRPr lang="en-US" dirty="0" smtClean="0"/>
           </a:p>
           <a:p>
             <a:pPr lvl="0"/>
@@ -22330,12 +22198,12 @@
       </p:grpSpPr>
       <p:sp>
         <p:nvSpPr>
-          <p:cNvPr id="2" name="Text Placeholder 1"/>
+          <p:cNvPr id="4" name="Title 3"/>
           <p:cNvSpPr>
             <a:spLocks noGrp="1"/>
           </p:cNvSpPr>
           <p:nvPr>
-            <p:ph type="body" sz="quarter" idx="11"/>
+            <p:ph type="title"/>
           </p:nvPr>
         </p:nvSpPr>
         <p:spPr/>
@@ -22344,21 +22212,20 @@
           <a:lstStyle/>
           <a:p>
             <a:r>
-              <a:rPr lang="en-GB" dirty="0" smtClean="0"/>
-              <a:t>DEMO</a:t>
-            </a:r>
-            <a:endParaRPr lang="en-US" dirty="0"/>
-          </a:p>
-        </p:txBody>
-      </p:sp>
-      <p:sp>
-        <p:nvSpPr>
-          <p:cNvPr id="3" name="Text Placeholder 2"/>
+              <a:rPr lang="en-US" dirty="0"/>
+              <a:t>COMMON Problems</a:t>
+            </a:r>
+          </a:p>
+        </p:txBody>
+      </p:sp>
+      <p:sp>
+        <p:nvSpPr>
+          <p:cNvPr id="5" name="Content Placeholder 4"/>
           <p:cNvSpPr>
             <a:spLocks noGrp="1"/>
           </p:cNvSpPr>
           <p:nvPr>
-            <p:ph type="body" sz="quarter" idx="12"/>
+            <p:ph sz="quarter" idx="12"/>
           </p:nvPr>
         </p:nvSpPr>
         <p:spPr/>
@@ -22366,18 +22233,82 @@
           <a:bodyPr/>
           <a:lstStyle/>
           <a:p>
-            <a:r>
-              <a:rPr lang="en-US" dirty="0" smtClean="0"/>
-              <a:t>Jobs</a:t>
-            </a:r>
-            <a:endParaRPr lang="en-US" dirty="0"/>
+            <a:pPr marL="285750" indent="-285750">
+              <a:lnSpc>
+                <a:spcPct val="150000"/>
+              </a:lnSpc>
+              <a:buFont typeface="Wingdings" panose="05000000000000000000" pitchFamily="2" charset="2"/>
+              <a:buChar char="q"/>
+            </a:pPr>
+            <a:r>
+              <a:rPr lang="en-GB" sz="2400" dirty="0" smtClean="0"/>
+              <a:t>Asynchronous long running tasks</a:t>
+            </a:r>
+          </a:p>
+          <a:p>
+            <a:pPr marL="285750" indent="-285750">
+              <a:lnSpc>
+                <a:spcPct val="150000"/>
+              </a:lnSpc>
+              <a:buFont typeface="Wingdings" panose="05000000000000000000" pitchFamily="2" charset="2"/>
+              <a:buChar char="q"/>
+            </a:pPr>
+            <a:r>
+              <a:rPr lang="en-GB" sz="2400" dirty="0" smtClean="0"/>
+              <a:t>Information about tasks results</a:t>
+            </a:r>
+          </a:p>
+          <a:p>
+            <a:pPr marL="285750" indent="-285750">
+              <a:lnSpc>
+                <a:spcPct val="150000"/>
+              </a:lnSpc>
+              <a:buFont typeface="Wingdings" panose="05000000000000000000" pitchFamily="2" charset="2"/>
+              <a:buChar char="q"/>
+            </a:pPr>
+            <a:r>
+              <a:rPr lang="en-GB" sz="2400" dirty="0" smtClean="0"/>
+              <a:t>Tasks retry</a:t>
+            </a:r>
+          </a:p>
+          <a:p>
+            <a:pPr marL="285750" indent="-285750">
+              <a:lnSpc>
+                <a:spcPct val="150000"/>
+              </a:lnSpc>
+              <a:buFont typeface="Wingdings" panose="05000000000000000000" pitchFamily="2" charset="2"/>
+              <a:buChar char="q"/>
+            </a:pPr>
+            <a:r>
+              <a:rPr lang="en-GB" sz="2400" dirty="0" smtClean="0"/>
+              <a:t>Custom tasks schedule </a:t>
+            </a:r>
+          </a:p>
+          <a:p>
+            <a:pPr marL="285750" indent="-285750">
+              <a:lnSpc>
+                <a:spcPct val="150000"/>
+              </a:lnSpc>
+              <a:buFont typeface="Wingdings" panose="05000000000000000000" pitchFamily="2" charset="2"/>
+              <a:buChar char="q"/>
+            </a:pPr>
+            <a:r>
+              <a:rPr lang="en-GB" sz="2400" dirty="0" smtClean="0"/>
+              <a:t>Using same business logic</a:t>
+            </a:r>
+          </a:p>
+          <a:p>
+            <a:pPr marL="0" indent="0">
+              <a:buNone/>
+            </a:pPr>
+            <a:endParaRPr lang="en-US" sz="1600" dirty="0"/>
           </a:p>
         </p:txBody>
       </p:sp>
     </p:spTree>
     <p:extLst>
       <p:ext uri="{BB962C8B-B14F-4D97-AF65-F5344CB8AC3E}">
-        <p14:creationId xmlns:p14="http://schemas.microsoft.com/office/powerpoint/2010/main" val="3346107813"/>
+        <p14:creationId xmlns:p14="http://schemas.microsoft.com/office/powerpoint/2010/main" val="3423468132"/>
       </p:ext>
     </p:extLst>
   </p:cSld>
@@ -22406,12 +22337,12 @@
       </p:grpSpPr>
       <p:sp>
         <p:nvSpPr>
-          <p:cNvPr id="2" name="Text Placeholder 1"/>
+          <p:cNvPr id="2" name="Title 1"/>
           <p:cNvSpPr>
             <a:spLocks noGrp="1"/>
           </p:cNvSpPr>
           <p:nvPr>
-            <p:ph type="body" sz="quarter" idx="11"/>
+            <p:ph type="title"/>
           </p:nvPr>
         </p:nvSpPr>
         <p:spPr/>
@@ -22420,21 +22351,21 @@
           <a:lstStyle/>
           <a:p>
             <a:r>
-              <a:rPr lang="en-US" sz="4400" dirty="0" smtClean="0"/>
-              <a:t>API</a:t>
-            </a:r>
-            <a:endParaRPr lang="en-US" sz="4400" dirty="0"/>
-          </a:p>
-        </p:txBody>
-      </p:sp>
-      <p:sp>
-        <p:nvSpPr>
-          <p:cNvPr id="3" name="Text Placeholder 2"/>
+              <a:rPr lang="en-US" b="1" dirty="0" smtClean="0"/>
+              <a:t>Scheduling JOBS</a:t>
+            </a:r>
+            <a:endParaRPr lang="en-US" dirty="0"/>
+          </a:p>
+        </p:txBody>
+      </p:sp>
+      <p:sp>
+        <p:nvSpPr>
+          <p:cNvPr id="4" name="Content Placeholder 3"/>
           <p:cNvSpPr>
             <a:spLocks noGrp="1"/>
           </p:cNvSpPr>
           <p:nvPr>
-            <p:ph type="body" sz="quarter" idx="12"/>
+            <p:ph sz="quarter" idx="12"/>
           </p:nvPr>
         </p:nvSpPr>
         <p:spPr/>
@@ -22442,18 +22373,104 @@
           <a:bodyPr/>
           <a:lstStyle/>
           <a:p>
-            <a:r>
-              <a:rPr lang="en-GB" dirty="0" smtClean="0"/>
-              <a:t>How to add it?</a:t>
-            </a:r>
-            <a:endParaRPr lang="en-US" dirty="0"/>
+            <a:pPr marL="342900" indent="-342900">
+              <a:lnSpc>
+                <a:spcPct val="150000"/>
+              </a:lnSpc>
+              <a:buFont typeface="Wingdings" panose="05000000000000000000" pitchFamily="2" charset="2"/>
+              <a:buChar char="q"/>
+            </a:pPr>
+            <a:r>
+              <a:rPr lang="en-US" sz="2400" dirty="0" smtClean="0"/>
+              <a:t>FluentScheduler</a:t>
+            </a:r>
+            <a:endParaRPr lang="en-US" sz="2400" dirty="0"/>
+          </a:p>
+          <a:p>
+            <a:pPr marL="342900" indent="-342900">
+              <a:lnSpc>
+                <a:spcPct val="150000"/>
+              </a:lnSpc>
+              <a:buFont typeface="Wingdings" panose="05000000000000000000" pitchFamily="2" charset="2"/>
+              <a:buChar char="q"/>
+            </a:pPr>
+            <a:r>
+              <a:rPr lang="en-US" sz="2400" dirty="0" smtClean="0"/>
+              <a:t>Ncrontab</a:t>
+            </a:r>
+          </a:p>
+          <a:p>
+            <a:pPr marL="342900" indent="-342900">
+              <a:lnSpc>
+                <a:spcPct val="150000"/>
+              </a:lnSpc>
+              <a:buFont typeface="Wingdings" panose="05000000000000000000" pitchFamily="2" charset="2"/>
+              <a:buChar char="q"/>
+            </a:pPr>
+            <a:r>
+              <a:rPr lang="en-US" sz="2400" dirty="0" smtClean="0"/>
+              <a:t>QuartzNet</a:t>
+            </a:r>
+          </a:p>
+          <a:p>
+            <a:pPr marL="342900" indent="-342900">
+              <a:lnSpc>
+                <a:spcPct val="150000"/>
+              </a:lnSpc>
+              <a:buFont typeface="Wingdings" panose="05000000000000000000" pitchFamily="2" charset="2"/>
+              <a:buChar char="q"/>
+            </a:pPr>
+            <a:r>
+              <a:rPr lang="en-US" sz="2400" dirty="0" smtClean="0"/>
+              <a:t>Hangfire</a:t>
+            </a:r>
+          </a:p>
+          <a:p>
+            <a:pPr marL="342900" indent="-342900">
+              <a:lnSpc>
+                <a:spcPct val="150000"/>
+              </a:lnSpc>
+              <a:buFont typeface="Wingdings" panose="05000000000000000000" pitchFamily="2" charset="2"/>
+              <a:buChar char="q"/>
+            </a:pPr>
+            <a:r>
+              <a:rPr lang="en-US" sz="2400" dirty="0" smtClean="0"/>
+              <a:t>Chroniton</a:t>
+            </a:r>
+          </a:p>
+          <a:p>
+            <a:pPr marL="342900" indent="-342900">
+              <a:lnSpc>
+                <a:spcPct val="150000"/>
+              </a:lnSpc>
+              <a:buFont typeface="Wingdings" panose="05000000000000000000" pitchFamily="2" charset="2"/>
+              <a:buChar char="q"/>
+            </a:pPr>
+            <a:r>
+              <a:rPr lang="en-US" sz="2400" dirty="0" smtClean="0"/>
+              <a:t>DurableTask</a:t>
+            </a:r>
+          </a:p>
+          <a:p>
+            <a:pPr marL="342900" indent="-342900">
+              <a:lnSpc>
+                <a:spcPct val="150000"/>
+              </a:lnSpc>
+              <a:buFont typeface="Wingdings" panose="05000000000000000000" pitchFamily="2" charset="2"/>
+              <a:buChar char="q"/>
+            </a:pPr>
+            <a:r>
+              <a:rPr lang="en-GB" sz="2400" dirty="0" smtClean="0"/>
+              <a:t>Others</a:t>
+            </a:r>
+            <a:endParaRPr lang="en-US" sz="2400" dirty="0"/>
           </a:p>
         </p:txBody>
       </p:sp>
     </p:spTree>
     <p:extLst>
       <p:ext uri="{BB962C8B-B14F-4D97-AF65-F5344CB8AC3E}">
-        <p14:creationId xmlns:p14="http://schemas.microsoft.com/office/powerpoint/2010/main" val="745999700"/>
+        <p14:creationId xmlns:p14="http://schemas.microsoft.com/office/powerpoint/2010/main" val="2336234496"/>
       </p:ext>
     </p:extLst>
   </p:cSld>
@@ -22482,12 +22499,12 @@
       </p:grpSpPr>
       <p:sp>
         <p:nvSpPr>
-          <p:cNvPr id="2" name="Title 1"/>
+          <p:cNvPr id="2" name="Text Placeholder 1"/>
           <p:cNvSpPr>
             <a:spLocks noGrp="1"/>
           </p:cNvSpPr>
           <p:nvPr>
-            <p:ph type="title"/>
+            <p:ph type="body" sz="quarter" idx="11"/>
           </p:nvPr>
         </p:nvSpPr>
         <p:spPr/>
@@ -22496,21 +22513,21 @@
           <a:lstStyle/>
           <a:p>
             <a:r>
-              <a:rPr lang="en-US" sz="3600" dirty="0" smtClean="0"/>
-              <a:t>Things to SEE</a:t>
-            </a:r>
-            <a:endParaRPr lang="en-US" sz="3600" dirty="0"/>
-          </a:p>
-        </p:txBody>
-      </p:sp>
-      <p:sp>
-        <p:nvSpPr>
-          <p:cNvPr id="4" name="Content Placeholder 3"/>
+              <a:rPr lang="en-GB" dirty="0" smtClean="0"/>
+              <a:t>DEMO</a:t>
+            </a:r>
+            <a:endParaRPr lang="en-US" dirty="0"/>
+          </a:p>
+        </p:txBody>
+      </p:sp>
+      <p:sp>
+        <p:nvSpPr>
+          <p:cNvPr id="3" name="Text Placeholder 2"/>
           <p:cNvSpPr>
             <a:spLocks noGrp="1"/>
           </p:cNvSpPr>
           <p:nvPr>
-            <p:ph sz="quarter" idx="12"/>
+            <p:ph type="body" sz="quarter" idx="12"/>
           </p:nvPr>
         </p:nvSpPr>
         <p:spPr/>
@@ -22518,84 +22535,18 @@
           <a:bodyPr/>
           <a:lstStyle/>
           <a:p>
-            <a:pPr marL="342900" indent="-342900">
-              <a:lnSpc>
-                <a:spcPct val="150000"/>
-              </a:lnSpc>
-              <a:buFont typeface="Wingdings" panose="05000000000000000000" pitchFamily="2" charset="2"/>
-              <a:buChar char="q"/>
-            </a:pPr>
-            <a:r>
-              <a:rPr lang="en-US" sz="2400" dirty="0" smtClean="0"/>
-              <a:t>Swashbuckle</a:t>
-            </a:r>
-            <a:endParaRPr lang="en-US" sz="2400" dirty="0"/>
-          </a:p>
-          <a:p>
-            <a:pPr marL="342900" indent="-342900">
-              <a:lnSpc>
-                <a:spcPct val="150000"/>
-              </a:lnSpc>
-              <a:buFont typeface="Wingdings" panose="05000000000000000000" pitchFamily="2" charset="2"/>
-              <a:buChar char="q"/>
-            </a:pPr>
-            <a:r>
-              <a:rPr lang="en-US" sz="2400" dirty="0" err="1" smtClean="0"/>
-              <a:t>NSwag</a:t>
-            </a:r>
-            <a:endParaRPr lang="en-US" sz="2400" dirty="0"/>
-          </a:p>
-          <a:p>
-            <a:pPr marL="342900" indent="-342900">
-              <a:lnSpc>
-                <a:spcPct val="150000"/>
-              </a:lnSpc>
-              <a:buFont typeface="Wingdings" panose="05000000000000000000" pitchFamily="2" charset="2"/>
-              <a:buChar char="q"/>
-            </a:pPr>
-            <a:r>
-              <a:rPr lang="en-US" sz="2400" dirty="0"/>
-              <a:t>RESTClient .</a:t>
-            </a:r>
-            <a:r>
-              <a:rPr lang="en-US" sz="2400" dirty="0" smtClean="0"/>
-              <a:t>NET</a:t>
-            </a:r>
-          </a:p>
-          <a:p>
-            <a:pPr marL="342900" indent="-342900">
-              <a:lnSpc>
-                <a:spcPct val="150000"/>
-              </a:lnSpc>
-              <a:buFont typeface="Wingdings" panose="05000000000000000000" pitchFamily="2" charset="2"/>
-              <a:buChar char="q"/>
-            </a:pPr>
-            <a:r>
-              <a:rPr lang="en-US" sz="2400" dirty="0" err="1" smtClean="0"/>
-              <a:t>GraphQL</a:t>
-            </a:r>
-            <a:endParaRPr lang="en-US" sz="2400" dirty="0"/>
-          </a:p>
-          <a:p>
-            <a:pPr marL="342900" indent="-342900">
-              <a:lnSpc>
-                <a:spcPct val="150000"/>
-              </a:lnSpc>
-              <a:buFont typeface="Wingdings" panose="05000000000000000000" pitchFamily="2" charset="2"/>
-              <a:buChar char="q"/>
-            </a:pPr>
-            <a:r>
-              <a:rPr lang="en-GB" sz="2400" dirty="0" smtClean="0"/>
-              <a:t>Others</a:t>
-            </a:r>
-            <a:endParaRPr lang="en-US" sz="2400" dirty="0"/>
+            <a:r>
+              <a:rPr lang="en-US" dirty="0" smtClean="0"/>
+              <a:t>Jobs</a:t>
+            </a:r>
+            <a:endParaRPr lang="en-US" dirty="0"/>
           </a:p>
         </p:txBody>
       </p:sp>
     </p:spTree>
     <p:extLst>
       <p:ext uri="{BB962C8B-B14F-4D97-AF65-F5344CB8AC3E}">
-        <p14:creationId xmlns:p14="http://schemas.microsoft.com/office/powerpoint/2010/main" val="3228834401"/>
+        <p14:creationId xmlns:p14="http://schemas.microsoft.com/office/powerpoint/2010/main" val="3346107813"/>
       </p:ext>
     </p:extLst>
   </p:cSld>
@@ -22632,14 +22583,19 @@
             <p:ph type="body" sz="quarter" idx="11"/>
           </p:nvPr>
         </p:nvSpPr>
-        <p:spPr/>
+        <p:spPr>
+          <a:xfrm>
+            <a:off x="539552" y="3429000"/>
+            <a:ext cx="3888432" cy="2160240"/>
+          </a:xfrm>
+        </p:spPr>
         <p:txBody>
           <a:bodyPr/>
           <a:lstStyle/>
           <a:p>
             <a:r>
-              <a:rPr lang="en-GB" dirty="0" smtClean="0"/>
-              <a:t>DEMO</a:t>
+              <a:rPr lang="en-US" dirty="0" smtClean="0"/>
+              <a:t>Questions</a:t>
             </a:r>
             <a:endParaRPr lang="en-US" dirty="0"/>
           </a:p>
@@ -22662,7 +22618,7 @@
           <a:p>
             <a:r>
               <a:rPr lang="en-US" dirty="0" smtClean="0"/>
-              <a:t>API</a:t>
+              <a:t>Feel free to ask anything</a:t>
             </a:r>
             <a:endParaRPr lang="en-US" dirty="0"/>
           </a:p>
@@ -22671,13 +22627,20 @@
     </p:spTree>
     <p:extLst>
       <p:ext uri="{BB962C8B-B14F-4D97-AF65-F5344CB8AC3E}">
-        <p14:creationId xmlns:p14="http://schemas.microsoft.com/office/powerpoint/2010/main" val="2097220158"/>
+        <p14:creationId xmlns:p14="http://schemas.microsoft.com/office/powerpoint/2010/main" val="2094703247"/>
       </p:ext>
     </p:extLst>
   </p:cSld>
   <p:clrMapOvr>
     <a:masterClrMapping/>
   </p:clrMapOvr>
+  <p:timing>
+    <p:tnLst>
+      <p:par>
+        <p:cTn id="1" dur="indefinite" restart="never" nodeType="tmRoot"/>
+      </p:par>
+    </p:tnLst>
+  </p:timing>
 </p:sld>
 </file>
 
@@ -22708,20 +22671,16 @@
             <p:ph type="body" sz="quarter" idx="11"/>
           </p:nvPr>
         </p:nvSpPr>
-        <p:spPr>
-          <a:xfrm>
-            <a:off x="539552" y="3429000"/>
-            <a:ext cx="6480720" cy="2160240"/>
-          </a:xfrm>
-        </p:spPr>
+        <p:spPr/>
         <p:txBody>
           <a:bodyPr/>
           <a:lstStyle/>
           <a:p>
             <a:r>
-              <a:rPr lang="en-US" sz="4400" dirty="0"/>
-              <a:t>Authentication</a:t>
-            </a:r>
+              <a:rPr lang="en-US" sz="4400" dirty="0" smtClean="0"/>
+              <a:t>API</a:t>
+            </a:r>
+            <a:endParaRPr lang="en-US" sz="4400" dirty="0"/>
           </a:p>
         </p:txBody>
       </p:sp>
@@ -22751,7 +22710,7 @@
     </p:spTree>
     <p:extLst>
       <p:ext uri="{BB962C8B-B14F-4D97-AF65-F5344CB8AC3E}">
-        <p14:creationId xmlns:p14="http://schemas.microsoft.com/office/powerpoint/2010/main" val="2513143034"/>
+        <p14:creationId xmlns:p14="http://schemas.microsoft.com/office/powerpoint/2010/main" val="745999700"/>
       </p:ext>
     </p:extLst>
   </p:cSld>
@@ -22795,7 +22754,7 @@
           <a:p>
             <a:r>
               <a:rPr lang="en-US" sz="3600" dirty="0" smtClean="0"/>
-              <a:t>WEB AUTHENTICATION</a:t>
+              <a:t>Things to SEE</a:t>
             </a:r>
             <a:endParaRPr lang="en-US" sz="3600" dirty="0"/>
           </a:p>
@@ -22824,9 +22783,10 @@
               <a:buChar char="q"/>
             </a:pPr>
             <a:r>
-              <a:rPr lang="en-US" sz="2400" dirty="0"/>
-              <a:t>HTTP Basic authentication</a:t>
-            </a:r>
+              <a:rPr lang="en-US" sz="2400" dirty="0" smtClean="0"/>
+              <a:t>Swashbuckle</a:t>
+            </a:r>
+            <a:endParaRPr lang="en-US" sz="2400" dirty="0"/>
           </a:p>
           <a:p>
             <a:pPr marL="342900" indent="-342900">
@@ -22837,9 +22797,10 @@
               <a:buChar char="q"/>
             </a:pPr>
             <a:r>
-              <a:rPr lang="en-US" sz="2400" dirty="0"/>
-              <a:t>Cookies</a:t>
-            </a:r>
+              <a:rPr lang="en-US" sz="2400" dirty="0" err="1" smtClean="0"/>
+              <a:t>NSwag</a:t>
+            </a:r>
+            <a:endParaRPr lang="en-US" sz="2400" dirty="0"/>
           </a:p>
           <a:p>
             <a:pPr marL="342900" indent="-342900">
@@ -22851,7 +22812,11 @@
             </a:pPr>
             <a:r>
               <a:rPr lang="en-US" sz="2400" dirty="0"/>
-              <a:t>Tokens</a:t>
+              <a:t>RESTClient .</a:t>
+            </a:r>
+            <a:r>
+              <a:rPr lang="en-US" sz="2400" dirty="0" smtClean="0"/>
+              <a:t>NET</a:t>
             </a:r>
           </a:p>
           <a:p>
@@ -22863,9 +22828,10 @@
               <a:buChar char="q"/>
             </a:pPr>
             <a:r>
-              <a:rPr lang="en-US" sz="2400" dirty="0"/>
-              <a:t>Signatures</a:t>
-            </a:r>
+              <a:rPr lang="en-US" sz="2400" dirty="0" err="1" smtClean="0"/>
+              <a:t>GraphQL</a:t>
+            </a:r>
+            <a:endParaRPr lang="en-US" sz="2400" dirty="0"/>
           </a:p>
           <a:p>
             <a:pPr marL="342900" indent="-342900">
@@ -22876,37 +22842,6 @@
               <a:buChar char="q"/>
             </a:pPr>
             <a:r>
-              <a:rPr lang="en-US" sz="2400" dirty="0"/>
-              <a:t>One-Time </a:t>
-            </a:r>
-            <a:r>
-              <a:rPr lang="en-US" sz="2400" dirty="0" smtClean="0"/>
-              <a:t>Passwords</a:t>
-            </a:r>
-          </a:p>
-          <a:p>
-            <a:pPr marL="342900" indent="-342900">
-              <a:lnSpc>
-                <a:spcPct val="150000"/>
-              </a:lnSpc>
-              <a:buFont typeface="Wingdings" panose="05000000000000000000" pitchFamily="2" charset="2"/>
-              <a:buChar char="q"/>
-            </a:pPr>
-            <a:r>
-              <a:rPr lang="en-GB" sz="2400" dirty="0" smtClean="0"/>
-              <a:t>Custom (dangerous)</a:t>
-            </a:r>
-            <a:endParaRPr lang="en-US" sz="2400" dirty="0"/>
-          </a:p>
-          <a:p>
-            <a:pPr marL="342900" indent="-342900">
-              <a:lnSpc>
-                <a:spcPct val="150000"/>
-              </a:lnSpc>
-              <a:buFont typeface="Wingdings" panose="05000000000000000000" pitchFamily="2" charset="2"/>
-              <a:buChar char="q"/>
-            </a:pPr>
-            <a:r>
               <a:rPr lang="en-GB" sz="2400" dirty="0" smtClean="0"/>
               <a:t>Others</a:t>
             </a:r>
@@ -22917,7 +22852,7 @@
     </p:spTree>
     <p:extLst>
       <p:ext uri="{BB962C8B-B14F-4D97-AF65-F5344CB8AC3E}">
-        <p14:creationId xmlns:p14="http://schemas.microsoft.com/office/powerpoint/2010/main" val="2859121369"/>
+        <p14:creationId xmlns:p14="http://schemas.microsoft.com/office/powerpoint/2010/main" val="3228834401"/>
       </p:ext>
     </p:extLst>
   </p:cSld>
@@ -22946,12 +22881,12 @@
       </p:grpSpPr>
       <p:sp>
         <p:nvSpPr>
-          <p:cNvPr id="2" name="Title 1"/>
+          <p:cNvPr id="2" name="Text Placeholder 1"/>
           <p:cNvSpPr>
             <a:spLocks noGrp="1"/>
           </p:cNvSpPr>
           <p:nvPr>
-            <p:ph type="title"/>
+            <p:ph type="body" sz="quarter" idx="11"/>
           </p:nvPr>
         </p:nvSpPr>
         <p:spPr/>
@@ -22960,21 +22895,21 @@
           <a:lstStyle/>
           <a:p>
             <a:r>
-              <a:rPr lang="en-US" sz="3600" dirty="0" smtClean="0"/>
-              <a:t>Things to SEE</a:t>
-            </a:r>
-            <a:endParaRPr lang="en-US" sz="3600" dirty="0"/>
-          </a:p>
-        </p:txBody>
-      </p:sp>
-      <p:sp>
-        <p:nvSpPr>
-          <p:cNvPr id="4" name="Content Placeholder 3"/>
+              <a:rPr lang="en-GB" dirty="0" smtClean="0"/>
+              <a:t>DEMO</a:t>
+            </a:r>
+            <a:endParaRPr lang="en-US" dirty="0"/>
+          </a:p>
+        </p:txBody>
+      </p:sp>
+      <p:sp>
+        <p:nvSpPr>
+          <p:cNvPr id="3" name="Text Placeholder 2"/>
           <p:cNvSpPr>
             <a:spLocks noGrp="1"/>
           </p:cNvSpPr>
           <p:nvPr>
-            <p:ph sz="quarter" idx="12"/>
+            <p:ph type="body" sz="quarter" idx="12"/>
           </p:nvPr>
         </p:nvSpPr>
         <p:spPr/>
@@ -22982,93 +22917,18 @@
           <a:bodyPr/>
           <a:lstStyle/>
           <a:p>
-            <a:pPr marL="342900" indent="-342900">
-              <a:lnSpc>
-                <a:spcPct val="150000"/>
-              </a:lnSpc>
-              <a:buFont typeface="Wingdings" panose="05000000000000000000" pitchFamily="2" charset="2"/>
-              <a:buChar char="q"/>
-            </a:pPr>
-            <a:r>
-              <a:rPr lang="en-US" sz="2400" dirty="0" smtClean="0"/>
-              <a:t>IdentityServer</a:t>
-            </a:r>
-          </a:p>
-          <a:p>
-            <a:pPr marL="342900" indent="-342900">
-              <a:lnSpc>
-                <a:spcPct val="150000"/>
-              </a:lnSpc>
-              <a:buFont typeface="Wingdings" panose="05000000000000000000" pitchFamily="2" charset="2"/>
-              <a:buChar char="q"/>
-            </a:pPr>
-            <a:r>
-              <a:rPr lang="en-US" sz="2400" dirty="0" smtClean="0"/>
-              <a:t>Auth0</a:t>
-            </a:r>
-          </a:p>
-          <a:p>
-            <a:pPr marL="342900" indent="-342900">
-              <a:lnSpc>
-                <a:spcPct val="150000"/>
-              </a:lnSpc>
-              <a:buFont typeface="Wingdings" panose="05000000000000000000" pitchFamily="2" charset="2"/>
-              <a:buChar char="q"/>
-            </a:pPr>
-            <a:r>
-              <a:rPr lang="en-US" sz="2400" dirty="0" err="1" smtClean="0"/>
-              <a:t>AspNet.Security.OpenIdConnect.Server</a:t>
-            </a:r>
-            <a:endParaRPr lang="en-US" sz="2400" dirty="0" smtClean="0"/>
-          </a:p>
-          <a:p>
-            <a:pPr marL="342900" indent="-342900">
-              <a:lnSpc>
-                <a:spcPct val="150000"/>
-              </a:lnSpc>
-              <a:buFont typeface="Wingdings" panose="05000000000000000000" pitchFamily="2" charset="2"/>
-              <a:buChar char="q"/>
-            </a:pPr>
-            <a:r>
-              <a:rPr lang="en-US" sz="2400" dirty="0" err="1" smtClean="0"/>
-              <a:t>Openiddict</a:t>
-            </a:r>
-            <a:endParaRPr lang="en-US" sz="2400" dirty="0" smtClean="0"/>
-          </a:p>
-          <a:p>
-            <a:pPr marL="342900" indent="-342900">
-              <a:lnSpc>
-                <a:spcPct val="150000"/>
-              </a:lnSpc>
-              <a:buFont typeface="Wingdings" panose="05000000000000000000" pitchFamily="2" charset="2"/>
-              <a:buChar char="q"/>
-            </a:pPr>
-            <a:r>
-              <a:rPr lang="en-US" sz="2400" dirty="0" err="1" smtClean="0"/>
-              <a:t>Stormpath-sdk</a:t>
-            </a:r>
-            <a:endParaRPr lang="en-US" sz="2400" dirty="0" smtClean="0"/>
-          </a:p>
-          <a:p>
-            <a:pPr marL="342900" indent="-342900">
-              <a:lnSpc>
-                <a:spcPct val="150000"/>
-              </a:lnSpc>
-              <a:buFont typeface="Wingdings" panose="05000000000000000000" pitchFamily="2" charset="2"/>
-              <a:buChar char="q"/>
-            </a:pPr>
-            <a:r>
-              <a:rPr lang="en-GB" sz="2400" dirty="0" smtClean="0"/>
-              <a:t>Others</a:t>
-            </a:r>
-            <a:endParaRPr lang="en-US" sz="2400" dirty="0"/>
+            <a:r>
+              <a:rPr lang="en-US" dirty="0" smtClean="0"/>
+              <a:t>API</a:t>
+            </a:r>
+            <a:endParaRPr lang="en-US" dirty="0"/>
           </a:p>
         </p:txBody>
       </p:sp>
     </p:spTree>
     <p:extLst>
       <p:ext uri="{BB962C8B-B14F-4D97-AF65-F5344CB8AC3E}">
-        <p14:creationId xmlns:p14="http://schemas.microsoft.com/office/powerpoint/2010/main" val="456919407"/>
+        <p14:creationId xmlns:p14="http://schemas.microsoft.com/office/powerpoint/2010/main" val="2097220158"/>
       </p:ext>
     </p:extLst>
   </p:cSld>
@@ -23105,14 +22965,19 @@
             <p:ph type="body" sz="quarter" idx="11"/>
           </p:nvPr>
         </p:nvSpPr>
-        <p:spPr/>
+        <p:spPr>
+          <a:xfrm>
+            <a:off x="539552" y="3429000"/>
+            <a:ext cx="3888432" cy="2160240"/>
+          </a:xfrm>
+        </p:spPr>
         <p:txBody>
           <a:bodyPr/>
           <a:lstStyle/>
           <a:p>
             <a:r>
-              <a:rPr lang="en-GB" dirty="0" smtClean="0"/>
-              <a:t>DEMO</a:t>
+              <a:rPr lang="en-US" dirty="0" smtClean="0"/>
+              <a:t>Questions</a:t>
             </a:r>
             <a:endParaRPr lang="en-US" dirty="0"/>
           </a:p>
@@ -23134,22 +22999,30 @@
           <a:lstStyle/>
           <a:p>
             <a:r>
-              <a:rPr lang="en-US" dirty="0"/>
-              <a:t>Authentication</a:t>
-            </a:r>
+              <a:rPr lang="en-US" dirty="0" smtClean="0"/>
+              <a:t>Feel free to ask anything</a:t>
+            </a:r>
+            <a:endParaRPr lang="en-US" dirty="0"/>
           </a:p>
         </p:txBody>
       </p:sp>
     </p:spTree>
     <p:extLst>
       <p:ext uri="{BB962C8B-B14F-4D97-AF65-F5344CB8AC3E}">
-        <p14:creationId xmlns:p14="http://schemas.microsoft.com/office/powerpoint/2010/main" val="3736516631"/>
+        <p14:creationId xmlns:p14="http://schemas.microsoft.com/office/powerpoint/2010/main" val="1053696170"/>
       </p:ext>
     </p:extLst>
   </p:cSld>
   <p:clrMapOvr>
     <a:masterClrMapping/>
   </p:clrMapOvr>
+  <p:timing>
+    <p:tnLst>
+      <p:par>
+        <p:cTn id="1" dur="indefinite" restart="never" nodeType="tmRoot"/>
+      </p:par>
+    </p:tnLst>
+  </p:timing>
 </p:sld>
 </file>
 
@@ -23191,10 +23064,9 @@
           <a:lstStyle/>
           <a:p>
             <a:r>
-              <a:rPr lang="en-US" sz="4400" dirty="0" smtClean="0"/>
-              <a:t>SOCKETS</a:t>
-            </a:r>
-            <a:endParaRPr lang="en-US" sz="4400" dirty="0"/>
+              <a:rPr lang="en-US" sz="4400" dirty="0"/>
+              <a:t>Authentication</a:t>
+            </a:r>
           </a:p>
         </p:txBody>
       </p:sp>
@@ -23224,7 +23096,7 @@
     </p:spTree>
     <p:extLst>
       <p:ext uri="{BB962C8B-B14F-4D97-AF65-F5344CB8AC3E}">
-        <p14:creationId xmlns:p14="http://schemas.microsoft.com/office/powerpoint/2010/main" val="3207702153"/>
+        <p14:creationId xmlns:p14="http://schemas.microsoft.com/office/powerpoint/2010/main" val="2513143034"/>
       </p:ext>
     </p:extLst>
   </p:cSld>
@@ -23268,7 +23140,7 @@
           <a:p>
             <a:r>
               <a:rPr lang="en-US" sz="3600" dirty="0" smtClean="0"/>
-              <a:t>WHEN to USE sockets</a:t>
+              <a:t>WEB AUTHENTICATION</a:t>
             </a:r>
             <a:endParaRPr lang="en-US" sz="3600" dirty="0"/>
           </a:p>
@@ -23298,7 +23170,7 @@
             </a:pPr>
             <a:r>
               <a:rPr lang="en-US" sz="2400" dirty="0"/>
-              <a:t>Real time applications</a:t>
+              <a:t>HTTP Basic authentication</a:t>
             </a:r>
           </a:p>
           <a:p>
@@ -23310,8 +23182,8 @@
               <a:buChar char="q"/>
             </a:pPr>
             <a:r>
-              <a:rPr lang="en-GB" sz="2400" dirty="0"/>
-              <a:t>Chats</a:t>
+              <a:rPr lang="en-US" sz="2400" dirty="0"/>
+              <a:t>Cookies</a:t>
             </a:r>
           </a:p>
           <a:p>
@@ -23324,7 +23196,7 @@
             </a:pPr>
             <a:r>
               <a:rPr lang="en-US" sz="2400" dirty="0"/>
-              <a:t>Video conferencing</a:t>
+              <a:t>Tokens</a:t>
             </a:r>
           </a:p>
           <a:p>
@@ -23337,7 +23209,7 @@
             </a:pPr>
             <a:r>
               <a:rPr lang="en-US" sz="2400" dirty="0"/>
-              <a:t>Multiplayer games</a:t>
+              <a:t>Signatures</a:t>
             </a:r>
           </a:p>
           <a:p>
@@ -23349,6 +23221,37 @@
               <a:buChar char="q"/>
             </a:pPr>
             <a:r>
+              <a:rPr lang="en-US" sz="2400" dirty="0"/>
+              <a:t>One-Time </a:t>
+            </a:r>
+            <a:r>
+              <a:rPr lang="en-US" sz="2400" dirty="0" smtClean="0"/>
+              <a:t>Passwords</a:t>
+            </a:r>
+          </a:p>
+          <a:p>
+            <a:pPr marL="342900" indent="-342900">
+              <a:lnSpc>
+                <a:spcPct val="150000"/>
+              </a:lnSpc>
+              <a:buFont typeface="Wingdings" panose="05000000000000000000" pitchFamily="2" charset="2"/>
+              <a:buChar char="q"/>
+            </a:pPr>
+            <a:r>
+              <a:rPr lang="en-GB" sz="2400" dirty="0" smtClean="0"/>
+              <a:t>Custom (dangerous)</a:t>
+            </a:r>
+            <a:endParaRPr lang="en-US" sz="2400" dirty="0"/>
+          </a:p>
+          <a:p>
+            <a:pPr marL="342900" indent="-342900">
+              <a:lnSpc>
+                <a:spcPct val="150000"/>
+              </a:lnSpc>
+              <a:buFont typeface="Wingdings" panose="05000000000000000000" pitchFamily="2" charset="2"/>
+              <a:buChar char="q"/>
+            </a:pPr>
+            <a:r>
               <a:rPr lang="en-GB" sz="2400" dirty="0" smtClean="0"/>
               <a:t>Others</a:t>
             </a:r>
@@ -23359,7 +23262,7 @@
     </p:spTree>
     <p:extLst>
       <p:ext uri="{BB962C8B-B14F-4D97-AF65-F5344CB8AC3E}">
-        <p14:creationId xmlns:p14="http://schemas.microsoft.com/office/powerpoint/2010/main" val="1657734529"/>
+        <p14:creationId xmlns:p14="http://schemas.microsoft.com/office/powerpoint/2010/main" val="2859121369"/>
       </p:ext>
     </p:extLst>
   </p:cSld>
@@ -23388,27 +23291,22 @@
       </p:grpSpPr>
       <p:sp>
         <p:nvSpPr>
-          <p:cNvPr id="2" name="Text Placeholder 1"/>
+          <p:cNvPr id="2" name="Title 1"/>
           <p:cNvSpPr>
             <a:spLocks noGrp="1"/>
           </p:cNvSpPr>
           <p:nvPr>
-            <p:ph type="body" sz="quarter" idx="11"/>
+            <p:ph type="title"/>
           </p:nvPr>
         </p:nvSpPr>
-        <p:spPr>
-          <a:xfrm>
-            <a:off x="539552" y="3429000"/>
-            <a:ext cx="4680520" cy="2160240"/>
-          </a:xfrm>
-        </p:spPr>
+        <p:spPr/>
         <p:txBody>
           <a:bodyPr/>
           <a:lstStyle/>
           <a:p>
             <a:r>
-              <a:rPr lang="en-GB" dirty="0" smtClean="0"/>
-              <a:t>LECTURE CONVENTION</a:t>
+              <a:rPr lang="en-GB" dirty="0"/>
+              <a:t>Plan</a:t>
             </a:r>
             <a:endParaRPr lang="en-US" dirty="0"/>
           </a:p>
@@ -23416,12 +23314,12 @@
       </p:sp>
       <p:sp>
         <p:nvSpPr>
-          <p:cNvPr id="3" name="Text Placeholder 2"/>
+          <p:cNvPr id="3" name="Content Placeholder 2"/>
           <p:cNvSpPr>
             <a:spLocks noGrp="1"/>
           </p:cNvSpPr>
           <p:nvPr>
-            <p:ph type="body" sz="quarter" idx="12"/>
+            <p:ph sz="quarter" idx="12"/>
           </p:nvPr>
         </p:nvSpPr>
         <p:spPr/>
@@ -23429,31 +23327,151 @@
           <a:bodyPr/>
           <a:lstStyle/>
           <a:p>
-            <a:r>
-              <a:rPr lang="en-GB" dirty="0" smtClean="0"/>
-              <a:t>TODO</a:t>
-            </a:r>
-            <a:endParaRPr lang="en-US" dirty="0"/>
+            <a:pPr>
+              <a:lnSpc>
+                <a:spcPct val="150000"/>
+              </a:lnSpc>
+            </a:pPr>
+            <a:r>
+              <a:rPr lang="en-GB" sz="2400" dirty="0"/>
+              <a:t> ASP.NET </a:t>
+            </a:r>
+            <a:r>
+              <a:rPr lang="en-US" sz="2400" dirty="0">
+                <a:solidFill>
+                  <a:srgbClr val="00B050"/>
+                </a:solidFill>
+              </a:rPr>
+              <a:t>✔</a:t>
+            </a:r>
+            <a:endParaRPr lang="en-GB" sz="3200" dirty="0"/>
+          </a:p>
+          <a:p>
+            <a:pPr lvl="1">
+              <a:lnSpc>
+                <a:spcPct val="150000"/>
+              </a:lnSpc>
+            </a:pPr>
+            <a:r>
+              <a:rPr lang="en-GB" sz="2400" dirty="0"/>
+              <a:t> History </a:t>
+            </a:r>
+            <a:r>
+              <a:rPr lang="en-US" sz="2400" dirty="0">
+                <a:solidFill>
+                  <a:srgbClr val="00B050"/>
+                </a:solidFill>
+              </a:rPr>
+              <a:t>✔</a:t>
+            </a:r>
+            <a:endParaRPr lang="en-GB" sz="2400" dirty="0"/>
+          </a:p>
+          <a:p>
+            <a:pPr lvl="1">
+              <a:lnSpc>
+                <a:spcPct val="150000"/>
+              </a:lnSpc>
+            </a:pPr>
+            <a:r>
+              <a:rPr lang="en-GB" sz="2400" dirty="0"/>
+              <a:t> Basics </a:t>
+            </a:r>
+            <a:r>
+              <a:rPr lang="en-US" sz="2400" dirty="0">
+                <a:solidFill>
+                  <a:srgbClr val="00B050"/>
+                </a:solidFill>
+              </a:rPr>
+              <a:t>✔</a:t>
+            </a:r>
+          </a:p>
+          <a:p>
+            <a:pPr>
+              <a:lnSpc>
+                <a:spcPct val="150000"/>
+              </a:lnSpc>
+            </a:pPr>
+            <a:r>
+              <a:rPr lang="en-GB" sz="2400" dirty="0"/>
+              <a:t> ASP.NET </a:t>
+            </a:r>
+            <a:r>
+              <a:rPr lang="en-GB" sz="2400" dirty="0" smtClean="0"/>
+              <a:t>CORE </a:t>
+            </a:r>
+            <a:r>
+              <a:rPr lang="en-US" sz="2400" dirty="0">
+                <a:solidFill>
+                  <a:srgbClr val="00B050"/>
+                </a:solidFill>
+              </a:rPr>
+              <a:t>✔</a:t>
+            </a:r>
+            <a:endParaRPr lang="en-GB" sz="2400" dirty="0"/>
+          </a:p>
+          <a:p>
+            <a:pPr lvl="1">
+              <a:lnSpc>
+                <a:spcPct val="150000"/>
+              </a:lnSpc>
+            </a:pPr>
+            <a:r>
+              <a:rPr lang="en-GB" sz="2400" dirty="0"/>
+              <a:t> </a:t>
+            </a:r>
+            <a:r>
+              <a:rPr lang="en-GB" sz="2400" dirty="0" smtClean="0"/>
+              <a:t>Changes </a:t>
+            </a:r>
+            <a:r>
+              <a:rPr lang="en-US" sz="2400" dirty="0">
+                <a:solidFill>
+                  <a:srgbClr val="00B050"/>
+                </a:solidFill>
+              </a:rPr>
+              <a:t>✔</a:t>
+            </a:r>
+            <a:endParaRPr lang="en-GB" sz="2400" dirty="0"/>
+          </a:p>
+          <a:p>
+            <a:pPr>
+              <a:lnSpc>
+                <a:spcPct val="150000"/>
+              </a:lnSpc>
+            </a:pPr>
+            <a:r>
+              <a:rPr lang="en-GB" sz="2400" dirty="0"/>
+              <a:t> ASP.NET CORE Common Tasks</a:t>
+            </a:r>
+          </a:p>
+          <a:p>
+            <a:pPr lvl="1">
+              <a:lnSpc>
+                <a:spcPct val="150000"/>
+              </a:lnSpc>
+            </a:pPr>
+            <a:r>
+              <a:rPr lang="en-GB" sz="2400" dirty="0"/>
+              <a:t> Tasks and solutions in </a:t>
+            </a:r>
+            <a:r>
+              <a:rPr lang="en-GB" sz="2400" dirty="0" smtClean="0"/>
+              <a:t>examples</a:t>
+            </a:r>
+            <a:endParaRPr lang="en-GB" sz="2400" dirty="0"/>
           </a:p>
         </p:txBody>
       </p:sp>
     </p:spTree>
     <p:extLst>
       <p:ext uri="{BB962C8B-B14F-4D97-AF65-F5344CB8AC3E}">
-        <p14:creationId xmlns:p14="http://schemas.microsoft.com/office/powerpoint/2010/main" val="3761066175"/>
+        <p14:creationId xmlns:p14="http://schemas.microsoft.com/office/powerpoint/2010/main" val="4285960568"/>
       </p:ext>
     </p:extLst>
   </p:cSld>
   <p:clrMapOvr>
     <a:masterClrMapping/>
   </p:clrMapOvr>
-  <p:timing>
-    <p:tnLst>
-      <p:par>
-        <p:cTn id="1" dur="indefinite" restart="never" nodeType="tmRoot"/>
-      </p:par>
-    </p:tnLst>
-  </p:timing>
 </p:sld>
 </file>
 
@@ -23520,10 +23538,9 @@
               <a:buChar char="q"/>
             </a:pPr>
             <a:r>
-              <a:rPr lang="en-GB" sz="2400" dirty="0" err="1" smtClean="0"/>
-              <a:t>SignalR</a:t>
-            </a:r>
-            <a:endParaRPr lang="en-GB" sz="2400" dirty="0" smtClean="0"/>
+              <a:rPr lang="en-US" sz="2400" dirty="0" smtClean="0"/>
+              <a:t>IdentityServer</a:t>
+            </a:r>
           </a:p>
           <a:p>
             <a:pPr marL="342900" indent="-342900">
@@ -23534,10 +23551,9 @@
               <a:buChar char="q"/>
             </a:pPr>
             <a:r>
-              <a:rPr lang="en-GB" sz="2400" dirty="0" err="1" smtClean="0"/>
-              <a:t>SuperSocket</a:t>
-            </a:r>
-            <a:endParaRPr lang="en-GB" sz="2400" dirty="0" smtClean="0"/>
+              <a:rPr lang="en-US" sz="2400" dirty="0" smtClean="0"/>
+              <a:t>Auth0</a:t>
+            </a:r>
           </a:p>
           <a:p>
             <a:pPr marL="342900" indent="-342900">
@@ -23548,10 +23564,10 @@
               <a:buChar char="q"/>
             </a:pPr>
             <a:r>
-              <a:rPr lang="en-GB" sz="2400" dirty="0" err="1" smtClean="0"/>
-              <a:t>WampSharp</a:t>
-            </a:r>
-            <a:endParaRPr lang="en-GB" sz="2400" dirty="0" smtClean="0"/>
+              <a:rPr lang="en-US" sz="2400" dirty="0" err="1" smtClean="0"/>
+              <a:t>AspNet.Security.OpenIdConnect.Server</a:t>
+            </a:r>
+            <a:endParaRPr lang="en-US" sz="2400" dirty="0" smtClean="0"/>
           </a:p>
           <a:p>
             <a:pPr marL="342900" indent="-342900">
@@ -23562,9 +23578,10 @@
               <a:buChar char="q"/>
             </a:pPr>
             <a:r>
-              <a:rPr lang="en-US" sz="2400" dirty="0"/>
-              <a:t>Websocket-Sharp</a:t>
-            </a:r>
+              <a:rPr lang="en-US" sz="2400" dirty="0" err="1" smtClean="0"/>
+              <a:t>Openiddict</a:t>
+            </a:r>
+            <a:endParaRPr lang="en-US" sz="2400" dirty="0" smtClean="0"/>
           </a:p>
           <a:p>
             <a:pPr marL="342900" indent="-342900">
@@ -23575,10 +23592,10 @@
               <a:buChar char="q"/>
             </a:pPr>
             <a:r>
-              <a:rPr lang="en-US" sz="2400" dirty="0"/>
-              <a:t>WebSocket4NET </a:t>
-            </a:r>
-            <a:endParaRPr lang="en-GB" sz="2400" dirty="0"/>
+              <a:rPr lang="en-US" sz="2400" dirty="0" err="1" smtClean="0"/>
+              <a:t>Stormpath-sdk</a:t>
+            </a:r>
+            <a:endParaRPr lang="en-US" sz="2400" dirty="0" smtClean="0"/>
           </a:p>
           <a:p>
             <a:pPr marL="342900" indent="-342900">
@@ -23599,7 +23616,7 @@
     </p:spTree>
     <p:extLst>
       <p:ext uri="{BB962C8B-B14F-4D97-AF65-F5344CB8AC3E}">
-        <p14:creationId xmlns:p14="http://schemas.microsoft.com/office/powerpoint/2010/main" val="3272167992"/>
+        <p14:creationId xmlns:p14="http://schemas.microsoft.com/office/powerpoint/2010/main" val="456919407"/>
       </p:ext>
     </p:extLst>
   </p:cSld>
@@ -23666,7 +23683,7 @@
           <a:p>
             <a:r>
               <a:rPr lang="en-US" dirty="0"/>
-              <a:t>SOCKETS</a:t>
+              <a:t>Authentication</a:t>
             </a:r>
           </a:p>
         </p:txBody>
@@ -23674,7 +23691,7 @@
     </p:spTree>
     <p:extLst>
       <p:ext uri="{BB962C8B-B14F-4D97-AF65-F5344CB8AC3E}">
-        <p14:creationId xmlns:p14="http://schemas.microsoft.com/office/powerpoint/2010/main" val="3986371061"/>
+        <p14:creationId xmlns:p14="http://schemas.microsoft.com/office/powerpoint/2010/main" val="3736516631"/>
       </p:ext>
     </p:extLst>
   </p:cSld>
@@ -23714,7 +23731,7 @@
         <p:spPr>
           <a:xfrm>
             <a:off x="539552" y="3429000"/>
-            <a:ext cx="6480720" cy="2160240"/>
+            <a:ext cx="3888432" cy="2160240"/>
           </a:xfrm>
         </p:spPr>
         <p:txBody>
@@ -23722,10 +23739,10 @@
           <a:lstStyle/>
           <a:p>
             <a:r>
-              <a:rPr lang="en-US" sz="4400" dirty="0" smtClean="0"/>
-              <a:t>TESTING</a:t>
-            </a:r>
-            <a:endParaRPr lang="en-US" sz="4400" dirty="0"/>
+              <a:rPr lang="en-US" dirty="0" smtClean="0"/>
+              <a:t>Questions</a:t>
+            </a:r>
+            <a:endParaRPr lang="en-US" dirty="0"/>
           </a:p>
         </p:txBody>
       </p:sp>
@@ -23745,8 +23762,8 @@
           <a:lstStyle/>
           <a:p>
             <a:r>
-              <a:rPr lang="en-GB" dirty="0" smtClean="0"/>
-              <a:t>How to add it?</a:t>
+              <a:rPr lang="en-US" dirty="0" smtClean="0"/>
+              <a:t>Feel free to ask anything</a:t>
             </a:r>
             <a:endParaRPr lang="en-US" dirty="0"/>
           </a:p>
@@ -23755,13 +23772,20 @@
     </p:spTree>
     <p:extLst>
       <p:ext uri="{BB962C8B-B14F-4D97-AF65-F5344CB8AC3E}">
-        <p14:creationId xmlns:p14="http://schemas.microsoft.com/office/powerpoint/2010/main" val="885143735"/>
+        <p14:creationId xmlns:p14="http://schemas.microsoft.com/office/powerpoint/2010/main" val="3538941778"/>
       </p:ext>
     </p:extLst>
   </p:cSld>
   <p:clrMapOvr>
     <a:masterClrMapping/>
   </p:clrMapOvr>
+  <p:timing>
+    <p:tnLst>
+      <p:par>
+        <p:cTn id="1" dur="indefinite" restart="never" nodeType="tmRoot"/>
+      </p:par>
+    </p:tnLst>
+  </p:timing>
 </p:sld>
 </file>
 
@@ -23784,35 +23808,40 @@
       </p:grpSpPr>
       <p:sp>
         <p:nvSpPr>
-          <p:cNvPr id="2" name="Title 1"/>
+          <p:cNvPr id="2" name="Text Placeholder 1"/>
           <p:cNvSpPr>
             <a:spLocks noGrp="1"/>
           </p:cNvSpPr>
           <p:nvPr>
-            <p:ph type="title"/>
+            <p:ph type="body" sz="quarter" idx="11"/>
           </p:nvPr>
         </p:nvSpPr>
-        <p:spPr/>
+        <p:spPr>
+          <a:xfrm>
+            <a:off x="539552" y="3429000"/>
+            <a:ext cx="6480720" cy="2160240"/>
+          </a:xfrm>
+        </p:spPr>
         <p:txBody>
           <a:bodyPr/>
           <a:lstStyle/>
           <a:p>
             <a:r>
-              <a:rPr lang="en-US" sz="3600" dirty="0" smtClean="0"/>
-              <a:t>Things to SEE</a:t>
-            </a:r>
-            <a:endParaRPr lang="en-US" sz="3600" dirty="0"/>
-          </a:p>
-        </p:txBody>
-      </p:sp>
-      <p:sp>
-        <p:nvSpPr>
-          <p:cNvPr id="4" name="Content Placeholder 3"/>
+              <a:rPr lang="en-US" sz="4400" dirty="0" smtClean="0"/>
+              <a:t>SOCKETS</a:t>
+            </a:r>
+            <a:endParaRPr lang="en-US" sz="4400" dirty="0"/>
+          </a:p>
+        </p:txBody>
+      </p:sp>
+      <p:sp>
+        <p:nvSpPr>
+          <p:cNvPr id="3" name="Text Placeholder 2"/>
           <p:cNvSpPr>
             <a:spLocks noGrp="1"/>
           </p:cNvSpPr>
           <p:nvPr>
-            <p:ph sz="quarter" idx="12"/>
+            <p:ph type="body" sz="quarter" idx="12"/>
           </p:nvPr>
         </p:nvSpPr>
         <p:spPr/>
@@ -23820,93 +23849,18 @@
           <a:bodyPr/>
           <a:lstStyle/>
           <a:p>
-            <a:pPr marL="342900" indent="-342900">
-              <a:lnSpc>
-                <a:spcPct val="150000"/>
-              </a:lnSpc>
-              <a:buFont typeface="Wingdings" panose="05000000000000000000" pitchFamily="2" charset="2"/>
-              <a:buChar char="q"/>
-            </a:pPr>
-            <a:r>
-              <a:rPr lang="en-US" sz="2400" dirty="0" err="1"/>
-              <a:t>NUnit</a:t>
-            </a:r>
-            <a:endParaRPr lang="en-US" sz="2400" dirty="0"/>
-          </a:p>
-          <a:p>
-            <a:pPr marL="342900" indent="-342900">
-              <a:lnSpc>
-                <a:spcPct val="150000"/>
-              </a:lnSpc>
-              <a:buFont typeface="Wingdings" panose="05000000000000000000" pitchFamily="2" charset="2"/>
-              <a:buChar char="q"/>
-            </a:pPr>
-            <a:r>
-              <a:rPr lang="en-GB" sz="2400" dirty="0" err="1"/>
-              <a:t>xUnit</a:t>
-            </a:r>
-            <a:endParaRPr lang="en-GB" sz="2400" dirty="0"/>
-          </a:p>
-          <a:p>
-            <a:pPr marL="342900" indent="-342900">
-              <a:lnSpc>
-                <a:spcPct val="150000"/>
-              </a:lnSpc>
-              <a:buFont typeface="Wingdings" panose="05000000000000000000" pitchFamily="2" charset="2"/>
-              <a:buChar char="q"/>
-            </a:pPr>
-            <a:r>
-              <a:rPr lang="en-US" sz="2400" dirty="0"/>
-              <a:t>Moq </a:t>
-            </a:r>
-            <a:endParaRPr lang="en-GB" sz="2400" dirty="0"/>
-          </a:p>
-          <a:p>
-            <a:pPr marL="342900" indent="-342900">
-              <a:lnSpc>
-                <a:spcPct val="150000"/>
-              </a:lnSpc>
-              <a:buFont typeface="Wingdings" panose="05000000000000000000" pitchFamily="2" charset="2"/>
-              <a:buChar char="q"/>
-            </a:pPr>
-            <a:r>
-              <a:rPr lang="en-US" sz="2400" dirty="0"/>
-              <a:t>Rhino Mocks</a:t>
-            </a:r>
-          </a:p>
-          <a:p>
-            <a:pPr marL="342900" indent="-342900">
-              <a:lnSpc>
-                <a:spcPct val="150000"/>
-              </a:lnSpc>
-              <a:buFont typeface="Wingdings" panose="05000000000000000000" pitchFamily="2" charset="2"/>
-              <a:buChar char="q"/>
-            </a:pPr>
-            <a:r>
-              <a:rPr lang="en-US" sz="2400" dirty="0"/>
-              <a:t>Bogus</a:t>
-            </a:r>
-          </a:p>
-          <a:p>
-            <a:pPr marL="342900" indent="-342900">
-              <a:lnSpc>
-                <a:spcPct val="150000"/>
-              </a:lnSpc>
-              <a:buFont typeface="Wingdings" panose="05000000000000000000" pitchFamily="2" charset="2"/>
-              <a:buChar char="q"/>
-            </a:pPr>
-            <a:r>
-              <a:rPr lang="en-GB" sz="2400" dirty="0" smtClean="0"/>
-              <a:t>Others</a:t>
-            </a:r>
-            <a:endParaRPr lang="en-US" sz="2400" dirty="0"/>
+            <a:r>
+              <a:rPr lang="en-GB" dirty="0" smtClean="0"/>
+              <a:t>How to add it?</a:t>
+            </a:r>
+            <a:endParaRPr lang="en-US" dirty="0"/>
           </a:p>
         </p:txBody>
       </p:sp>
     </p:spTree>
     <p:extLst>
       <p:ext uri="{BB962C8B-B14F-4D97-AF65-F5344CB8AC3E}">
-        <p14:creationId xmlns:p14="http://schemas.microsoft.com/office/powerpoint/2010/main" val="2982989150"/>
+        <p14:creationId xmlns:p14="http://schemas.microsoft.com/office/powerpoint/2010/main" val="3207702153"/>
       </p:ext>
     </p:extLst>
   </p:cSld>
@@ -23935,12 +23889,12 @@
       </p:grpSpPr>
       <p:sp>
         <p:nvSpPr>
-          <p:cNvPr id="2" name="Text Placeholder 1"/>
+          <p:cNvPr id="2" name="Title 1"/>
           <p:cNvSpPr>
             <a:spLocks noGrp="1"/>
           </p:cNvSpPr>
           <p:nvPr>
-            <p:ph type="body" sz="quarter" idx="11"/>
+            <p:ph type="title"/>
           </p:nvPr>
         </p:nvSpPr>
         <p:spPr/>
@@ -23949,21 +23903,21 @@
           <a:lstStyle/>
           <a:p>
             <a:r>
-              <a:rPr lang="en-GB" dirty="0" smtClean="0"/>
-              <a:t>DEMO</a:t>
-            </a:r>
-            <a:endParaRPr lang="en-US" dirty="0"/>
-          </a:p>
-        </p:txBody>
-      </p:sp>
-      <p:sp>
-        <p:nvSpPr>
-          <p:cNvPr id="3" name="Text Placeholder 2"/>
+              <a:rPr lang="en-US" sz="3600" dirty="0" smtClean="0"/>
+              <a:t>WHEN to USE sockets</a:t>
+            </a:r>
+            <a:endParaRPr lang="en-US" sz="3600" dirty="0"/>
+          </a:p>
+        </p:txBody>
+      </p:sp>
+      <p:sp>
+        <p:nvSpPr>
+          <p:cNvPr id="4" name="Content Placeholder 3"/>
           <p:cNvSpPr>
             <a:spLocks noGrp="1"/>
           </p:cNvSpPr>
           <p:nvPr>
-            <p:ph type="body" sz="quarter" idx="12"/>
+            <p:ph sz="quarter" idx="12"/>
           </p:nvPr>
         </p:nvSpPr>
         <p:spPr/>
@@ -23971,18 +23925,77 @@
           <a:bodyPr/>
           <a:lstStyle/>
           <a:p>
-            <a:r>
-              <a:rPr lang="en-US" dirty="0" smtClean="0"/>
-              <a:t>Testing</a:t>
-            </a:r>
-            <a:endParaRPr lang="en-US" dirty="0"/>
+            <a:pPr marL="342900" indent="-342900">
+              <a:lnSpc>
+                <a:spcPct val="150000"/>
+              </a:lnSpc>
+              <a:buFont typeface="Wingdings" panose="05000000000000000000" pitchFamily="2" charset="2"/>
+              <a:buChar char="q"/>
+            </a:pPr>
+            <a:r>
+              <a:rPr lang="en-US" sz="2400" dirty="0"/>
+              <a:t>Real time applications</a:t>
+            </a:r>
+          </a:p>
+          <a:p>
+            <a:pPr marL="342900" indent="-342900">
+              <a:lnSpc>
+                <a:spcPct val="150000"/>
+              </a:lnSpc>
+              <a:buFont typeface="Wingdings" panose="05000000000000000000" pitchFamily="2" charset="2"/>
+              <a:buChar char="q"/>
+            </a:pPr>
+            <a:r>
+              <a:rPr lang="en-GB" sz="2400" dirty="0"/>
+              <a:t>Chats</a:t>
+            </a:r>
+          </a:p>
+          <a:p>
+            <a:pPr marL="342900" indent="-342900">
+              <a:lnSpc>
+                <a:spcPct val="150000"/>
+              </a:lnSpc>
+              <a:buFont typeface="Wingdings" panose="05000000000000000000" pitchFamily="2" charset="2"/>
+              <a:buChar char="q"/>
+            </a:pPr>
+            <a:r>
+              <a:rPr lang="en-US" sz="2400" dirty="0"/>
+              <a:t>Video conferencing</a:t>
+            </a:r>
+          </a:p>
+          <a:p>
+            <a:pPr marL="342900" indent="-342900">
+              <a:lnSpc>
+                <a:spcPct val="150000"/>
+              </a:lnSpc>
+              <a:buFont typeface="Wingdings" panose="05000000000000000000" pitchFamily="2" charset="2"/>
+              <a:buChar char="q"/>
+            </a:pPr>
+            <a:r>
+              <a:rPr lang="en-US" sz="2400" dirty="0"/>
+              <a:t>Multiplayer games</a:t>
+            </a:r>
+          </a:p>
+          <a:p>
+            <a:pPr marL="342900" indent="-342900">
+              <a:lnSpc>
+                <a:spcPct val="150000"/>
+              </a:lnSpc>
+              <a:buFont typeface="Wingdings" panose="05000000000000000000" pitchFamily="2" charset="2"/>
+              <a:buChar char="q"/>
+            </a:pPr>
+            <a:r>
+              <a:rPr lang="en-GB" sz="2400" dirty="0" smtClean="0"/>
+              <a:t>Others</a:t>
+            </a:r>
+            <a:endParaRPr lang="en-US" sz="2400" dirty="0"/>
           </a:p>
         </p:txBody>
       </p:sp>
     </p:spTree>
     <p:extLst>
       <p:ext uri="{BB962C8B-B14F-4D97-AF65-F5344CB8AC3E}">
-        <p14:creationId xmlns:p14="http://schemas.microsoft.com/office/powerpoint/2010/main" val="89994936"/>
+        <p14:creationId xmlns:p14="http://schemas.microsoft.com/office/powerpoint/2010/main" val="1657734529"/>
       </p:ext>
     </p:extLst>
   </p:cSld>
@@ -24025,6 +24038,751 @@
           <a:lstStyle/>
           <a:p>
             <a:r>
+              <a:rPr lang="en-US" sz="3600" dirty="0" smtClean="0"/>
+              <a:t>Things to SEE</a:t>
+            </a:r>
+            <a:endParaRPr lang="en-US" sz="3600" dirty="0"/>
+          </a:p>
+        </p:txBody>
+      </p:sp>
+      <p:sp>
+        <p:nvSpPr>
+          <p:cNvPr id="4" name="Content Placeholder 3"/>
+          <p:cNvSpPr>
+            <a:spLocks noGrp="1"/>
+          </p:cNvSpPr>
+          <p:nvPr>
+            <p:ph sz="quarter" idx="12"/>
+          </p:nvPr>
+        </p:nvSpPr>
+        <p:spPr/>
+        <p:txBody>
+          <a:bodyPr/>
+          <a:lstStyle/>
+          <a:p>
+            <a:pPr marL="342900" indent="-342900">
+              <a:lnSpc>
+                <a:spcPct val="150000"/>
+              </a:lnSpc>
+              <a:buFont typeface="Wingdings" panose="05000000000000000000" pitchFamily="2" charset="2"/>
+              <a:buChar char="q"/>
+            </a:pPr>
+            <a:r>
+              <a:rPr lang="en-GB" sz="2400" dirty="0" err="1" smtClean="0"/>
+              <a:t>SignalR</a:t>
+            </a:r>
+            <a:endParaRPr lang="en-GB" sz="2400" dirty="0" smtClean="0"/>
+          </a:p>
+          <a:p>
+            <a:pPr marL="342900" indent="-342900">
+              <a:lnSpc>
+                <a:spcPct val="150000"/>
+              </a:lnSpc>
+              <a:buFont typeface="Wingdings" panose="05000000000000000000" pitchFamily="2" charset="2"/>
+              <a:buChar char="q"/>
+            </a:pPr>
+            <a:r>
+              <a:rPr lang="en-GB" sz="2400" dirty="0" err="1" smtClean="0"/>
+              <a:t>SuperSocket</a:t>
+            </a:r>
+            <a:endParaRPr lang="en-GB" sz="2400" dirty="0" smtClean="0"/>
+          </a:p>
+          <a:p>
+            <a:pPr marL="342900" indent="-342900">
+              <a:lnSpc>
+                <a:spcPct val="150000"/>
+              </a:lnSpc>
+              <a:buFont typeface="Wingdings" panose="05000000000000000000" pitchFamily="2" charset="2"/>
+              <a:buChar char="q"/>
+            </a:pPr>
+            <a:r>
+              <a:rPr lang="en-GB" sz="2400" dirty="0" err="1" smtClean="0"/>
+              <a:t>WampSharp</a:t>
+            </a:r>
+            <a:endParaRPr lang="en-GB" sz="2400" dirty="0" smtClean="0"/>
+          </a:p>
+          <a:p>
+            <a:pPr marL="342900" indent="-342900">
+              <a:lnSpc>
+                <a:spcPct val="150000"/>
+              </a:lnSpc>
+              <a:buFont typeface="Wingdings" panose="05000000000000000000" pitchFamily="2" charset="2"/>
+              <a:buChar char="q"/>
+            </a:pPr>
+            <a:r>
+              <a:rPr lang="en-US" sz="2400" dirty="0"/>
+              <a:t>Websocket-Sharp</a:t>
+            </a:r>
+          </a:p>
+          <a:p>
+            <a:pPr marL="342900" indent="-342900">
+              <a:lnSpc>
+                <a:spcPct val="150000"/>
+              </a:lnSpc>
+              <a:buFont typeface="Wingdings" panose="05000000000000000000" pitchFamily="2" charset="2"/>
+              <a:buChar char="q"/>
+            </a:pPr>
+            <a:r>
+              <a:rPr lang="en-US" sz="2400" dirty="0"/>
+              <a:t>WebSocket4NET </a:t>
+            </a:r>
+            <a:endParaRPr lang="en-GB" sz="2400" dirty="0"/>
+          </a:p>
+          <a:p>
+            <a:pPr marL="342900" indent="-342900">
+              <a:lnSpc>
+                <a:spcPct val="150000"/>
+              </a:lnSpc>
+              <a:buFont typeface="Wingdings" panose="05000000000000000000" pitchFamily="2" charset="2"/>
+              <a:buChar char="q"/>
+            </a:pPr>
+            <a:r>
+              <a:rPr lang="en-GB" sz="2400" dirty="0" smtClean="0"/>
+              <a:t>Others</a:t>
+            </a:r>
+            <a:endParaRPr lang="en-US" sz="2400" dirty="0"/>
+          </a:p>
+        </p:txBody>
+      </p:sp>
+    </p:spTree>
+    <p:extLst>
+      <p:ext uri="{BB962C8B-B14F-4D97-AF65-F5344CB8AC3E}">
+        <p14:creationId xmlns:p14="http://schemas.microsoft.com/office/powerpoint/2010/main" val="3272167992"/>
+      </p:ext>
+    </p:extLst>
+  </p:cSld>
+  <p:clrMapOvr>
+    <a:masterClrMapping/>
+  </p:clrMapOvr>
+</p:sld>
+</file>
+
+<file path=ppt/slides/slide36.xml><?xml version="1.0" encoding="utf-8"?>
+<p:sld xmlns:a="http://schemas.openxmlformats.org/drawingml/2006/main" xmlns:r="http://schemas.openxmlformats.org/officeDocument/2006/relationships" xmlns:p="http://schemas.openxmlformats.org/presentationml/2006/main">
+  <p:cSld>
+    <p:spTree>
+      <p:nvGrpSpPr>
+        <p:cNvPr id="1" name=""/>
+        <p:cNvGrpSpPr/>
+        <p:nvPr/>
+      </p:nvGrpSpPr>
+      <p:grpSpPr>
+        <a:xfrm>
+          <a:off x="0" y="0"/>
+          <a:ext cx="0" cy="0"/>
+          <a:chOff x="0" y="0"/>
+          <a:chExt cx="0" cy="0"/>
+        </a:xfrm>
+      </p:grpSpPr>
+      <p:sp>
+        <p:nvSpPr>
+          <p:cNvPr id="2" name="Text Placeholder 1"/>
+          <p:cNvSpPr>
+            <a:spLocks noGrp="1"/>
+          </p:cNvSpPr>
+          <p:nvPr>
+            <p:ph type="body" sz="quarter" idx="11"/>
+          </p:nvPr>
+        </p:nvSpPr>
+        <p:spPr/>
+        <p:txBody>
+          <a:bodyPr/>
+          <a:lstStyle/>
+          <a:p>
+            <a:r>
+              <a:rPr lang="en-GB" dirty="0" smtClean="0"/>
+              <a:t>DEMO</a:t>
+            </a:r>
+            <a:endParaRPr lang="en-US" dirty="0"/>
+          </a:p>
+        </p:txBody>
+      </p:sp>
+      <p:sp>
+        <p:nvSpPr>
+          <p:cNvPr id="3" name="Text Placeholder 2"/>
+          <p:cNvSpPr>
+            <a:spLocks noGrp="1"/>
+          </p:cNvSpPr>
+          <p:nvPr>
+            <p:ph type="body" sz="quarter" idx="12"/>
+          </p:nvPr>
+        </p:nvSpPr>
+        <p:spPr/>
+        <p:txBody>
+          <a:bodyPr/>
+          <a:lstStyle/>
+          <a:p>
+            <a:r>
+              <a:rPr lang="en-US" dirty="0"/>
+              <a:t>SOCKETS</a:t>
+            </a:r>
+          </a:p>
+        </p:txBody>
+      </p:sp>
+    </p:spTree>
+    <p:extLst>
+      <p:ext uri="{BB962C8B-B14F-4D97-AF65-F5344CB8AC3E}">
+        <p14:creationId xmlns:p14="http://schemas.microsoft.com/office/powerpoint/2010/main" val="3986371061"/>
+      </p:ext>
+    </p:extLst>
+  </p:cSld>
+  <p:clrMapOvr>
+    <a:masterClrMapping/>
+  </p:clrMapOvr>
+</p:sld>
+</file>
+
+<file path=ppt/slides/slide37.xml><?xml version="1.0" encoding="utf-8"?>
+<p:sld xmlns:a="http://schemas.openxmlformats.org/drawingml/2006/main" xmlns:r="http://schemas.openxmlformats.org/officeDocument/2006/relationships" xmlns:p="http://schemas.openxmlformats.org/presentationml/2006/main">
+  <p:cSld>
+    <p:spTree>
+      <p:nvGrpSpPr>
+        <p:cNvPr id="1" name=""/>
+        <p:cNvGrpSpPr/>
+        <p:nvPr/>
+      </p:nvGrpSpPr>
+      <p:grpSpPr>
+        <a:xfrm>
+          <a:off x="0" y="0"/>
+          <a:ext cx="0" cy="0"/>
+          <a:chOff x="0" y="0"/>
+          <a:chExt cx="0" cy="0"/>
+        </a:xfrm>
+      </p:grpSpPr>
+      <p:sp>
+        <p:nvSpPr>
+          <p:cNvPr id="2" name="Text Placeholder 1"/>
+          <p:cNvSpPr>
+            <a:spLocks noGrp="1"/>
+          </p:cNvSpPr>
+          <p:nvPr>
+            <p:ph type="body" sz="quarter" idx="11"/>
+          </p:nvPr>
+        </p:nvSpPr>
+        <p:spPr>
+          <a:xfrm>
+            <a:off x="539552" y="3429000"/>
+            <a:ext cx="3888432" cy="2160240"/>
+          </a:xfrm>
+        </p:spPr>
+        <p:txBody>
+          <a:bodyPr/>
+          <a:lstStyle/>
+          <a:p>
+            <a:r>
+              <a:rPr lang="en-US" dirty="0" smtClean="0"/>
+              <a:t>Questions</a:t>
+            </a:r>
+            <a:endParaRPr lang="en-US" dirty="0"/>
+          </a:p>
+        </p:txBody>
+      </p:sp>
+      <p:sp>
+        <p:nvSpPr>
+          <p:cNvPr id="3" name="Text Placeholder 2"/>
+          <p:cNvSpPr>
+            <a:spLocks noGrp="1"/>
+          </p:cNvSpPr>
+          <p:nvPr>
+            <p:ph type="body" sz="quarter" idx="12"/>
+          </p:nvPr>
+        </p:nvSpPr>
+        <p:spPr/>
+        <p:txBody>
+          <a:bodyPr/>
+          <a:lstStyle/>
+          <a:p>
+            <a:r>
+              <a:rPr lang="en-US" dirty="0" smtClean="0"/>
+              <a:t>Feel free to ask anything</a:t>
+            </a:r>
+            <a:endParaRPr lang="en-US" dirty="0"/>
+          </a:p>
+        </p:txBody>
+      </p:sp>
+    </p:spTree>
+    <p:extLst>
+      <p:ext uri="{BB962C8B-B14F-4D97-AF65-F5344CB8AC3E}">
+        <p14:creationId xmlns:p14="http://schemas.microsoft.com/office/powerpoint/2010/main" val="1459517470"/>
+      </p:ext>
+    </p:extLst>
+  </p:cSld>
+  <p:clrMapOvr>
+    <a:masterClrMapping/>
+  </p:clrMapOvr>
+  <p:timing>
+    <p:tnLst>
+      <p:par>
+        <p:cTn id="1" dur="indefinite" restart="never" nodeType="tmRoot"/>
+      </p:par>
+    </p:tnLst>
+  </p:timing>
+</p:sld>
+</file>
+
+<file path=ppt/slides/slide38.xml><?xml version="1.0" encoding="utf-8"?>
+<p:sld xmlns:a="http://schemas.openxmlformats.org/drawingml/2006/main" xmlns:r="http://schemas.openxmlformats.org/officeDocument/2006/relationships" xmlns:p="http://schemas.openxmlformats.org/presentationml/2006/main">
+  <p:cSld>
+    <p:spTree>
+      <p:nvGrpSpPr>
+        <p:cNvPr id="1" name=""/>
+        <p:cNvGrpSpPr/>
+        <p:nvPr/>
+      </p:nvGrpSpPr>
+      <p:grpSpPr>
+        <a:xfrm>
+          <a:off x="0" y="0"/>
+          <a:ext cx="0" cy="0"/>
+          <a:chOff x="0" y="0"/>
+          <a:chExt cx="0" cy="0"/>
+        </a:xfrm>
+      </p:grpSpPr>
+      <p:sp>
+        <p:nvSpPr>
+          <p:cNvPr id="2" name="Text Placeholder 1"/>
+          <p:cNvSpPr>
+            <a:spLocks noGrp="1"/>
+          </p:cNvSpPr>
+          <p:nvPr>
+            <p:ph type="body" sz="quarter" idx="11"/>
+          </p:nvPr>
+        </p:nvSpPr>
+        <p:spPr>
+          <a:xfrm>
+            <a:off x="539552" y="3429000"/>
+            <a:ext cx="6480720" cy="2160240"/>
+          </a:xfrm>
+        </p:spPr>
+        <p:txBody>
+          <a:bodyPr/>
+          <a:lstStyle/>
+          <a:p>
+            <a:r>
+              <a:rPr lang="en-US" sz="4400" dirty="0" smtClean="0"/>
+              <a:t>TESTING</a:t>
+            </a:r>
+            <a:endParaRPr lang="en-US" sz="4400" dirty="0"/>
+          </a:p>
+        </p:txBody>
+      </p:sp>
+      <p:sp>
+        <p:nvSpPr>
+          <p:cNvPr id="3" name="Text Placeholder 2"/>
+          <p:cNvSpPr>
+            <a:spLocks noGrp="1"/>
+          </p:cNvSpPr>
+          <p:nvPr>
+            <p:ph type="body" sz="quarter" idx="12"/>
+          </p:nvPr>
+        </p:nvSpPr>
+        <p:spPr/>
+        <p:txBody>
+          <a:bodyPr/>
+          <a:lstStyle/>
+          <a:p>
+            <a:r>
+              <a:rPr lang="en-GB" dirty="0" smtClean="0"/>
+              <a:t>How to add it?</a:t>
+            </a:r>
+            <a:endParaRPr lang="en-US" dirty="0"/>
+          </a:p>
+        </p:txBody>
+      </p:sp>
+    </p:spTree>
+    <p:extLst>
+      <p:ext uri="{BB962C8B-B14F-4D97-AF65-F5344CB8AC3E}">
+        <p14:creationId xmlns:p14="http://schemas.microsoft.com/office/powerpoint/2010/main" val="885143735"/>
+      </p:ext>
+    </p:extLst>
+  </p:cSld>
+  <p:clrMapOvr>
+    <a:masterClrMapping/>
+  </p:clrMapOvr>
+</p:sld>
+</file>
+
+<file path=ppt/slides/slide39.xml><?xml version="1.0" encoding="utf-8"?>
+<p:sld xmlns:a="http://schemas.openxmlformats.org/drawingml/2006/main" xmlns:r="http://schemas.openxmlformats.org/officeDocument/2006/relationships" xmlns:p="http://schemas.openxmlformats.org/presentationml/2006/main">
+  <p:cSld>
+    <p:spTree>
+      <p:nvGrpSpPr>
+        <p:cNvPr id="1" name=""/>
+        <p:cNvGrpSpPr/>
+        <p:nvPr/>
+      </p:nvGrpSpPr>
+      <p:grpSpPr>
+        <a:xfrm>
+          <a:off x="0" y="0"/>
+          <a:ext cx="0" cy="0"/>
+          <a:chOff x="0" y="0"/>
+          <a:chExt cx="0" cy="0"/>
+        </a:xfrm>
+      </p:grpSpPr>
+      <p:sp>
+        <p:nvSpPr>
+          <p:cNvPr id="2" name="Title 1"/>
+          <p:cNvSpPr>
+            <a:spLocks noGrp="1"/>
+          </p:cNvSpPr>
+          <p:nvPr>
+            <p:ph type="title"/>
+          </p:nvPr>
+        </p:nvSpPr>
+        <p:spPr/>
+        <p:txBody>
+          <a:bodyPr/>
+          <a:lstStyle/>
+          <a:p>
+            <a:r>
+              <a:rPr lang="en-US" sz="3600" dirty="0" smtClean="0"/>
+              <a:t>Things to SEE</a:t>
+            </a:r>
+            <a:endParaRPr lang="en-US" sz="3600" dirty="0"/>
+          </a:p>
+        </p:txBody>
+      </p:sp>
+      <p:sp>
+        <p:nvSpPr>
+          <p:cNvPr id="4" name="Content Placeholder 3"/>
+          <p:cNvSpPr>
+            <a:spLocks noGrp="1"/>
+          </p:cNvSpPr>
+          <p:nvPr>
+            <p:ph sz="quarter" idx="12"/>
+          </p:nvPr>
+        </p:nvSpPr>
+        <p:spPr/>
+        <p:txBody>
+          <a:bodyPr/>
+          <a:lstStyle/>
+          <a:p>
+            <a:pPr marL="342900" indent="-342900">
+              <a:lnSpc>
+                <a:spcPct val="150000"/>
+              </a:lnSpc>
+              <a:buFont typeface="Wingdings" panose="05000000000000000000" pitchFamily="2" charset="2"/>
+              <a:buChar char="q"/>
+            </a:pPr>
+            <a:r>
+              <a:rPr lang="en-US" sz="2400" dirty="0" err="1"/>
+              <a:t>NUnit</a:t>
+            </a:r>
+            <a:endParaRPr lang="en-US" sz="2400" dirty="0"/>
+          </a:p>
+          <a:p>
+            <a:pPr marL="342900" indent="-342900">
+              <a:lnSpc>
+                <a:spcPct val="150000"/>
+              </a:lnSpc>
+              <a:buFont typeface="Wingdings" panose="05000000000000000000" pitchFamily="2" charset="2"/>
+              <a:buChar char="q"/>
+            </a:pPr>
+            <a:r>
+              <a:rPr lang="en-GB" sz="2400" dirty="0" err="1"/>
+              <a:t>xUnit</a:t>
+            </a:r>
+            <a:endParaRPr lang="en-GB" sz="2400" dirty="0"/>
+          </a:p>
+          <a:p>
+            <a:pPr marL="342900" indent="-342900">
+              <a:lnSpc>
+                <a:spcPct val="150000"/>
+              </a:lnSpc>
+              <a:buFont typeface="Wingdings" panose="05000000000000000000" pitchFamily="2" charset="2"/>
+              <a:buChar char="q"/>
+            </a:pPr>
+            <a:r>
+              <a:rPr lang="en-US" sz="2400" dirty="0"/>
+              <a:t>Moq </a:t>
+            </a:r>
+            <a:endParaRPr lang="en-GB" sz="2400" dirty="0"/>
+          </a:p>
+          <a:p>
+            <a:pPr marL="342900" indent="-342900">
+              <a:lnSpc>
+                <a:spcPct val="150000"/>
+              </a:lnSpc>
+              <a:buFont typeface="Wingdings" panose="05000000000000000000" pitchFamily="2" charset="2"/>
+              <a:buChar char="q"/>
+            </a:pPr>
+            <a:r>
+              <a:rPr lang="en-US" sz="2400" dirty="0"/>
+              <a:t>Rhino Mocks</a:t>
+            </a:r>
+          </a:p>
+          <a:p>
+            <a:pPr marL="342900" indent="-342900">
+              <a:lnSpc>
+                <a:spcPct val="150000"/>
+              </a:lnSpc>
+              <a:buFont typeface="Wingdings" panose="05000000000000000000" pitchFamily="2" charset="2"/>
+              <a:buChar char="q"/>
+            </a:pPr>
+            <a:r>
+              <a:rPr lang="en-US" sz="2400" dirty="0"/>
+              <a:t>Bogus</a:t>
+            </a:r>
+          </a:p>
+          <a:p>
+            <a:pPr marL="342900" indent="-342900">
+              <a:lnSpc>
+                <a:spcPct val="150000"/>
+              </a:lnSpc>
+              <a:buFont typeface="Wingdings" panose="05000000000000000000" pitchFamily="2" charset="2"/>
+              <a:buChar char="q"/>
+            </a:pPr>
+            <a:r>
+              <a:rPr lang="en-GB" sz="2400" dirty="0" smtClean="0"/>
+              <a:t>Others</a:t>
+            </a:r>
+            <a:endParaRPr lang="en-US" sz="2400" dirty="0"/>
+          </a:p>
+        </p:txBody>
+      </p:sp>
+    </p:spTree>
+    <p:extLst>
+      <p:ext uri="{BB962C8B-B14F-4D97-AF65-F5344CB8AC3E}">
+        <p14:creationId xmlns:p14="http://schemas.microsoft.com/office/powerpoint/2010/main" val="2982989150"/>
+      </p:ext>
+    </p:extLst>
+  </p:cSld>
+  <p:clrMapOvr>
+    <a:masterClrMapping/>
+  </p:clrMapOvr>
+</p:sld>
+</file>
+
+<file path=ppt/slides/slide4.xml><?xml version="1.0" encoding="utf-8"?>
+<p:sld xmlns:a="http://schemas.openxmlformats.org/drawingml/2006/main" xmlns:r="http://schemas.openxmlformats.org/officeDocument/2006/relationships" xmlns:p="http://schemas.openxmlformats.org/presentationml/2006/main">
+  <p:cSld>
+    <p:spTree>
+      <p:nvGrpSpPr>
+        <p:cNvPr id="1" name=""/>
+        <p:cNvGrpSpPr/>
+        <p:nvPr/>
+      </p:nvGrpSpPr>
+      <p:grpSpPr>
+        <a:xfrm>
+          <a:off x="0" y="0"/>
+          <a:ext cx="0" cy="0"/>
+          <a:chOff x="0" y="0"/>
+          <a:chExt cx="0" cy="0"/>
+        </a:xfrm>
+      </p:grpSpPr>
+      <p:sp>
+        <p:nvSpPr>
+          <p:cNvPr id="2" name="Title 1"/>
+          <p:cNvSpPr>
+            <a:spLocks noGrp="1"/>
+          </p:cNvSpPr>
+          <p:nvPr>
+            <p:ph type="title"/>
+          </p:nvPr>
+        </p:nvSpPr>
+        <p:spPr/>
+        <p:txBody>
+          <a:bodyPr/>
+          <a:lstStyle/>
+          <a:p>
+            <a:r>
+              <a:rPr lang="en-GB" dirty="0"/>
+              <a:t>LECTURE CONVENTION</a:t>
+            </a:r>
+            <a:endParaRPr lang="en-US" dirty="0"/>
+          </a:p>
+        </p:txBody>
+      </p:sp>
+      <p:sp>
+        <p:nvSpPr>
+          <p:cNvPr id="3" name="Content Placeholder 2"/>
+          <p:cNvSpPr>
+            <a:spLocks noGrp="1"/>
+          </p:cNvSpPr>
+          <p:nvPr>
+            <p:ph sz="quarter" idx="12"/>
+          </p:nvPr>
+        </p:nvSpPr>
+        <p:spPr/>
+        <p:txBody>
+          <a:bodyPr/>
+          <a:lstStyle/>
+          <a:p>
+            <a:pPr marL="342900" indent="-342900">
+              <a:lnSpc>
+                <a:spcPct val="150000"/>
+              </a:lnSpc>
+              <a:buFont typeface="Wingdings" panose="05000000000000000000" pitchFamily="2" charset="2"/>
+              <a:buChar char="q"/>
+            </a:pPr>
+            <a:r>
+              <a:rPr lang="en-GB" sz="2400" dirty="0"/>
+              <a:t>Lectures will be split in logical parts</a:t>
+            </a:r>
+          </a:p>
+          <a:p>
+            <a:pPr marL="342900" indent="-342900">
+              <a:lnSpc>
+                <a:spcPct val="150000"/>
+              </a:lnSpc>
+              <a:buFont typeface="Wingdings" panose="05000000000000000000" pitchFamily="2" charset="2"/>
+              <a:buChar char="q"/>
+            </a:pPr>
+            <a:r>
+              <a:rPr lang="en-GB" sz="2400" dirty="0"/>
+              <a:t>You can should ask question after each logical part during special slide</a:t>
+            </a:r>
+          </a:p>
+          <a:p>
+            <a:pPr marL="342900" indent="-342900">
+              <a:lnSpc>
+                <a:spcPct val="150000"/>
+              </a:lnSpc>
+              <a:buFont typeface="Wingdings" panose="05000000000000000000" pitchFamily="2" charset="2"/>
+              <a:buChar char="q"/>
+            </a:pPr>
+            <a:r>
+              <a:rPr lang="en-GB" sz="2400" dirty="0"/>
+              <a:t>Questions should be somehow connected to ASP </a:t>
+            </a:r>
+          </a:p>
+          <a:p>
+            <a:pPr marL="342900" indent="-342900">
+              <a:lnSpc>
+                <a:spcPct val="150000"/>
+              </a:lnSpc>
+              <a:buFont typeface="Wingdings" panose="05000000000000000000" pitchFamily="2" charset="2"/>
+              <a:buChar char="q"/>
+            </a:pPr>
+            <a:r>
+              <a:rPr lang="en-GB" sz="2400" dirty="0"/>
+              <a:t>We can afford breaks</a:t>
+            </a:r>
+            <a:endParaRPr lang="en-US" sz="2400" dirty="0"/>
+          </a:p>
+        </p:txBody>
+      </p:sp>
+    </p:spTree>
+    <p:extLst>
+      <p:ext uri="{BB962C8B-B14F-4D97-AF65-F5344CB8AC3E}">
+        <p14:creationId xmlns:p14="http://schemas.microsoft.com/office/powerpoint/2010/main" val="1813077974"/>
+      </p:ext>
+    </p:extLst>
+  </p:cSld>
+  <p:clrMapOvr>
+    <a:masterClrMapping/>
+  </p:clrMapOvr>
+</p:sld>
+</file>
+
+<file path=ppt/slides/slide40.xml><?xml version="1.0" encoding="utf-8"?>
+<p:sld xmlns:a="http://schemas.openxmlformats.org/drawingml/2006/main" xmlns:r="http://schemas.openxmlformats.org/officeDocument/2006/relationships" xmlns:p="http://schemas.openxmlformats.org/presentationml/2006/main">
+  <p:cSld>
+    <p:spTree>
+      <p:nvGrpSpPr>
+        <p:cNvPr id="1" name=""/>
+        <p:cNvGrpSpPr/>
+        <p:nvPr/>
+      </p:nvGrpSpPr>
+      <p:grpSpPr>
+        <a:xfrm>
+          <a:off x="0" y="0"/>
+          <a:ext cx="0" cy="0"/>
+          <a:chOff x="0" y="0"/>
+          <a:chExt cx="0" cy="0"/>
+        </a:xfrm>
+      </p:grpSpPr>
+      <p:sp>
+        <p:nvSpPr>
+          <p:cNvPr id="2" name="Text Placeholder 1"/>
+          <p:cNvSpPr>
+            <a:spLocks noGrp="1"/>
+          </p:cNvSpPr>
+          <p:nvPr>
+            <p:ph type="body" sz="quarter" idx="11"/>
+          </p:nvPr>
+        </p:nvSpPr>
+        <p:spPr/>
+        <p:txBody>
+          <a:bodyPr/>
+          <a:lstStyle/>
+          <a:p>
+            <a:r>
+              <a:rPr lang="en-GB" dirty="0" smtClean="0"/>
+              <a:t>DEMO</a:t>
+            </a:r>
+            <a:endParaRPr lang="en-US" dirty="0"/>
+          </a:p>
+        </p:txBody>
+      </p:sp>
+      <p:sp>
+        <p:nvSpPr>
+          <p:cNvPr id="3" name="Text Placeholder 2"/>
+          <p:cNvSpPr>
+            <a:spLocks noGrp="1"/>
+          </p:cNvSpPr>
+          <p:nvPr>
+            <p:ph type="body" sz="quarter" idx="12"/>
+          </p:nvPr>
+        </p:nvSpPr>
+        <p:spPr/>
+        <p:txBody>
+          <a:bodyPr/>
+          <a:lstStyle/>
+          <a:p>
+            <a:r>
+              <a:rPr lang="en-US" dirty="0" smtClean="0"/>
+              <a:t>Testing</a:t>
+            </a:r>
+            <a:endParaRPr lang="en-US" dirty="0"/>
+          </a:p>
+        </p:txBody>
+      </p:sp>
+    </p:spTree>
+    <p:extLst>
+      <p:ext uri="{BB962C8B-B14F-4D97-AF65-F5344CB8AC3E}">
+        <p14:creationId xmlns:p14="http://schemas.microsoft.com/office/powerpoint/2010/main" val="89994936"/>
+      </p:ext>
+    </p:extLst>
+  </p:cSld>
+  <p:clrMapOvr>
+    <a:masterClrMapping/>
+  </p:clrMapOvr>
+</p:sld>
+</file>
+
+<file path=ppt/slides/slide41.xml><?xml version="1.0" encoding="utf-8"?>
+<p:sld xmlns:a="http://schemas.openxmlformats.org/drawingml/2006/main" xmlns:r="http://schemas.openxmlformats.org/officeDocument/2006/relationships" xmlns:p="http://schemas.openxmlformats.org/presentationml/2006/main">
+  <p:cSld>
+    <p:spTree>
+      <p:nvGrpSpPr>
+        <p:cNvPr id="1" name=""/>
+        <p:cNvGrpSpPr/>
+        <p:nvPr/>
+      </p:nvGrpSpPr>
+      <p:grpSpPr>
+        <a:xfrm>
+          <a:off x="0" y="0"/>
+          <a:ext cx="0" cy="0"/>
+          <a:chOff x="0" y="0"/>
+          <a:chExt cx="0" cy="0"/>
+        </a:xfrm>
+      </p:grpSpPr>
+      <p:sp>
+        <p:nvSpPr>
+          <p:cNvPr id="2" name="Title 1"/>
+          <p:cNvSpPr>
+            <a:spLocks noGrp="1"/>
+          </p:cNvSpPr>
+          <p:nvPr>
+            <p:ph type="title"/>
+          </p:nvPr>
+        </p:nvSpPr>
+        <p:spPr/>
+        <p:txBody>
+          <a:bodyPr/>
+          <a:lstStyle/>
+          <a:p>
+            <a:r>
               <a:rPr lang="en-GB" dirty="0" smtClean="0"/>
               <a:t>OTHER	THINGS to SEE</a:t>
             </a:r>
@@ -24127,7 +24885,95 @@
 </p:sld>
 </file>
 
-<file path=ppt/slides/slide36.xml><?xml version="1.0" encoding="utf-8"?>
+<file path=ppt/slides/slide42.xml><?xml version="1.0" encoding="utf-8"?>
+<p:sld xmlns:a="http://schemas.openxmlformats.org/drawingml/2006/main" xmlns:r="http://schemas.openxmlformats.org/officeDocument/2006/relationships" xmlns:p="http://schemas.openxmlformats.org/presentationml/2006/main">
+  <p:cSld>
+    <p:spTree>
+      <p:nvGrpSpPr>
+        <p:cNvPr id="1" name=""/>
+        <p:cNvGrpSpPr/>
+        <p:nvPr/>
+      </p:nvGrpSpPr>
+      <p:grpSpPr>
+        <a:xfrm>
+          <a:off x="0" y="0"/>
+          <a:ext cx="0" cy="0"/>
+          <a:chOff x="0" y="0"/>
+          <a:chExt cx="0" cy="0"/>
+        </a:xfrm>
+      </p:grpSpPr>
+      <p:sp>
+        <p:nvSpPr>
+          <p:cNvPr id="2" name="Text Placeholder 1"/>
+          <p:cNvSpPr>
+            <a:spLocks noGrp="1"/>
+          </p:cNvSpPr>
+          <p:nvPr>
+            <p:ph type="body" sz="quarter" idx="11"/>
+          </p:nvPr>
+        </p:nvSpPr>
+        <p:spPr>
+          <a:xfrm>
+            <a:off x="539552" y="3429000"/>
+            <a:ext cx="3888432" cy="2160240"/>
+          </a:xfrm>
+        </p:spPr>
+        <p:txBody>
+          <a:bodyPr/>
+          <a:lstStyle/>
+          <a:p>
+            <a:r>
+              <a:rPr lang="en-US" dirty="0" smtClean="0"/>
+              <a:t>Questions</a:t>
+            </a:r>
+            <a:endParaRPr lang="en-US" dirty="0"/>
+          </a:p>
+        </p:txBody>
+      </p:sp>
+      <p:sp>
+        <p:nvSpPr>
+          <p:cNvPr id="3" name="Text Placeholder 2"/>
+          <p:cNvSpPr>
+            <a:spLocks noGrp="1"/>
+          </p:cNvSpPr>
+          <p:nvPr>
+            <p:ph type="body" sz="quarter" idx="12"/>
+          </p:nvPr>
+        </p:nvSpPr>
+        <p:spPr/>
+        <p:txBody>
+          <a:bodyPr/>
+          <a:lstStyle/>
+          <a:p>
+            <a:r>
+              <a:rPr lang="en-US" dirty="0" smtClean="0"/>
+              <a:t>Feel free to ask anything</a:t>
+            </a:r>
+            <a:endParaRPr lang="en-US" dirty="0"/>
+          </a:p>
+        </p:txBody>
+      </p:sp>
+    </p:spTree>
+    <p:extLst>
+      <p:ext uri="{BB962C8B-B14F-4D97-AF65-F5344CB8AC3E}">
+        <p14:creationId xmlns:p14="http://schemas.microsoft.com/office/powerpoint/2010/main" val="2786450621"/>
+      </p:ext>
+    </p:extLst>
+  </p:cSld>
+  <p:clrMapOvr>
+    <a:masterClrMapping/>
+  </p:clrMapOvr>
+  <p:timing>
+    <p:tnLst>
+      <p:par>
+        <p:cTn id="1" dur="indefinite" restart="never" nodeType="tmRoot"/>
+      </p:par>
+    </p:tnLst>
+  </p:timing>
+</p:sld>
+</file>
+
+<file path=ppt/slides/slide43.xml><?xml version="1.0" encoding="utf-8"?>
 <p:sld xmlns:a="http://schemas.openxmlformats.org/drawingml/2006/main" xmlns:r="http://schemas.openxmlformats.org/officeDocument/2006/relationships" xmlns:p="http://schemas.openxmlformats.org/presentationml/2006/main">
   <p:cSld>
     <p:spTree>
@@ -24157,87 +25003,6 @@
 </p:sld>
 </file>
 
-<file path=ppt/slides/slide4.xml><?xml version="1.0" encoding="utf-8"?>
-<p:sld xmlns:a="http://schemas.openxmlformats.org/drawingml/2006/main" xmlns:r="http://schemas.openxmlformats.org/officeDocument/2006/relationships" xmlns:p="http://schemas.openxmlformats.org/presentationml/2006/main">
-  <p:cSld>
-    <p:spTree>
-      <p:nvGrpSpPr>
-        <p:cNvPr id="1" name=""/>
-        <p:cNvGrpSpPr/>
-        <p:nvPr/>
-      </p:nvGrpSpPr>
-      <p:grpSpPr>
-        <a:xfrm>
-          <a:off x="0" y="0"/>
-          <a:ext cx="0" cy="0"/>
-          <a:chOff x="0" y="0"/>
-          <a:chExt cx="0" cy="0"/>
-        </a:xfrm>
-      </p:grpSpPr>
-      <p:sp>
-        <p:nvSpPr>
-          <p:cNvPr id="2" name="Text Placeholder 1"/>
-          <p:cNvSpPr>
-            <a:spLocks noGrp="1"/>
-          </p:cNvSpPr>
-          <p:nvPr>
-            <p:ph type="body" sz="quarter" idx="11"/>
-          </p:nvPr>
-        </p:nvSpPr>
-        <p:spPr>
-          <a:xfrm>
-            <a:off x="539552" y="3429000"/>
-            <a:ext cx="5112568" cy="2160240"/>
-          </a:xfrm>
-        </p:spPr>
-        <p:txBody>
-          <a:bodyPr/>
-          <a:lstStyle/>
-          <a:p>
-            <a:r>
-              <a:rPr lang="en-US" dirty="0" smtClean="0"/>
-              <a:t>ASP.NET CORE Common Tasks</a:t>
-            </a:r>
-            <a:endParaRPr lang="en-US" dirty="0"/>
-          </a:p>
-        </p:txBody>
-      </p:sp>
-      <p:sp>
-        <p:nvSpPr>
-          <p:cNvPr id="3" name="Text Placeholder 2"/>
-          <p:cNvSpPr>
-            <a:spLocks noGrp="1"/>
-          </p:cNvSpPr>
-          <p:nvPr>
-            <p:ph type="body" sz="quarter" idx="12"/>
-          </p:nvPr>
-        </p:nvSpPr>
-        <p:spPr/>
-        <p:txBody>
-          <a:bodyPr/>
-          <a:lstStyle/>
-          <a:p>
-            <a:r>
-              <a:rPr lang="en-US" dirty="0" smtClean="0"/>
-              <a:t>Deep dive</a:t>
-            </a:r>
-            <a:endParaRPr lang="en-US" dirty="0"/>
-          </a:p>
-        </p:txBody>
-      </p:sp>
-    </p:spTree>
-    <p:extLst>
-      <p:ext uri="{BB962C8B-B14F-4D97-AF65-F5344CB8AC3E}">
-        <p14:creationId xmlns:p14="http://schemas.microsoft.com/office/powerpoint/2010/main" val="3194048973"/>
-      </p:ext>
-    </p:extLst>
-  </p:cSld>
-  <p:clrMapOvr>
-    <a:masterClrMapping/>
-  </p:clrMapOvr>
-</p:sld>
-</file>
-
 <file path=ppt/slides/slide5.xml><?xml version="1.0" encoding="utf-8"?>
 <p:sld xmlns:a="http://schemas.openxmlformats.org/drawingml/2006/main" xmlns:r="http://schemas.openxmlformats.org/officeDocument/2006/relationships" xmlns:p="http://schemas.openxmlformats.org/presentationml/2006/main">
   <p:cSld>
@@ -24257,22 +25022,27 @@
       </p:grpSpPr>
       <p:sp>
         <p:nvSpPr>
-          <p:cNvPr id="2" name="Title 1"/>
+          <p:cNvPr id="2" name="Text Placeholder 1"/>
           <p:cNvSpPr>
             <a:spLocks noGrp="1"/>
           </p:cNvSpPr>
           <p:nvPr>
-            <p:ph type="title"/>
+            <p:ph type="body" sz="quarter" idx="11"/>
           </p:nvPr>
         </p:nvSpPr>
-        <p:spPr/>
+        <p:spPr>
+          <a:xfrm>
+            <a:off x="539552" y="3429000"/>
+            <a:ext cx="5112568" cy="2160240"/>
+          </a:xfrm>
+        </p:spPr>
         <p:txBody>
           <a:bodyPr/>
           <a:lstStyle/>
           <a:p>
             <a:r>
-              <a:rPr lang="en-GB" dirty="0" smtClean="0"/>
-              <a:t>Common Tasks</a:t>
+              <a:rPr lang="en-US" dirty="0" smtClean="0"/>
+              <a:t>ASP.NET CORE Common Tasks</a:t>
             </a:r>
             <a:endParaRPr lang="en-US" dirty="0"/>
           </a:p>
@@ -24280,12 +25050,12 @@
       </p:sp>
       <p:sp>
         <p:nvSpPr>
-          <p:cNvPr id="4" name="Content Placeholder 3"/>
+          <p:cNvPr id="3" name="Text Placeholder 2"/>
           <p:cNvSpPr>
             <a:spLocks noGrp="1"/>
           </p:cNvSpPr>
           <p:nvPr>
-            <p:ph sz="quarter" idx="12"/>
+            <p:ph type="body" sz="quarter" idx="12"/>
           </p:nvPr>
         </p:nvSpPr>
         <p:spPr/>
@@ -24293,89 +25063,18 @@
           <a:bodyPr/>
           <a:lstStyle/>
           <a:p>
-            <a:pPr>
-              <a:lnSpc>
-                <a:spcPct val="150000"/>
-              </a:lnSpc>
-            </a:pPr>
-            <a:r>
-              <a:rPr lang="en-GB" sz="2400" dirty="0" smtClean="0"/>
-              <a:t>Architecture</a:t>
-            </a:r>
-            <a:endParaRPr lang="en-US" sz="2400" dirty="0" smtClean="0"/>
-          </a:p>
-          <a:p>
-            <a:pPr>
-              <a:lnSpc>
-                <a:spcPct val="150000"/>
-              </a:lnSpc>
-            </a:pPr>
-            <a:r>
-              <a:rPr lang="en-US" sz="2400" dirty="0" smtClean="0"/>
-              <a:t>Database</a:t>
-            </a:r>
-          </a:p>
-          <a:p>
-            <a:pPr>
-              <a:lnSpc>
-                <a:spcPct val="150000"/>
-              </a:lnSpc>
-            </a:pPr>
-            <a:r>
-              <a:rPr lang="en-US" sz="2400" dirty="0" smtClean="0"/>
-              <a:t>Jobs</a:t>
-            </a:r>
-          </a:p>
-          <a:p>
-            <a:pPr>
-              <a:lnSpc>
-                <a:spcPct val="150000"/>
-              </a:lnSpc>
-            </a:pPr>
-            <a:r>
-              <a:rPr lang="en-US" sz="2400" dirty="0" smtClean="0"/>
-              <a:t>API</a:t>
-            </a:r>
-          </a:p>
-          <a:p>
-            <a:pPr>
-              <a:lnSpc>
-                <a:spcPct val="150000"/>
-              </a:lnSpc>
-            </a:pPr>
-            <a:r>
-              <a:rPr lang="en-US" sz="2400" dirty="0" smtClean="0"/>
-              <a:t>Authentication</a:t>
-            </a:r>
-          </a:p>
-          <a:p>
-            <a:pPr>
-              <a:lnSpc>
-                <a:spcPct val="150000"/>
-              </a:lnSpc>
-            </a:pPr>
-            <a:r>
-              <a:rPr lang="en-US" sz="2400" dirty="0" smtClean="0"/>
-              <a:t>Sockets</a:t>
-            </a:r>
-          </a:p>
-          <a:p>
-            <a:pPr>
-              <a:lnSpc>
-                <a:spcPct val="150000"/>
-              </a:lnSpc>
-            </a:pPr>
-            <a:r>
-              <a:rPr lang="en-US" sz="2400" dirty="0" smtClean="0"/>
-              <a:t>Testing</a:t>
-            </a:r>
+            <a:r>
+              <a:rPr lang="en-US" dirty="0" smtClean="0"/>
+              <a:t>Deep dive</a:t>
+            </a:r>
+            <a:endParaRPr lang="en-US" dirty="0"/>
           </a:p>
         </p:txBody>
       </p:sp>
     </p:spTree>
     <p:extLst>
       <p:ext uri="{BB962C8B-B14F-4D97-AF65-F5344CB8AC3E}">
-        <p14:creationId xmlns:p14="http://schemas.microsoft.com/office/powerpoint/2010/main" val="839796294"/>
+        <p14:creationId xmlns:p14="http://schemas.microsoft.com/office/powerpoint/2010/main" val="3194048973"/>
       </p:ext>
     </p:extLst>
   </p:cSld>
@@ -24404,6 +25103,153 @@
       </p:grpSpPr>
       <p:sp>
         <p:nvSpPr>
+          <p:cNvPr id="2" name="Title 1"/>
+          <p:cNvSpPr>
+            <a:spLocks noGrp="1"/>
+          </p:cNvSpPr>
+          <p:nvPr>
+            <p:ph type="title"/>
+          </p:nvPr>
+        </p:nvSpPr>
+        <p:spPr/>
+        <p:txBody>
+          <a:bodyPr/>
+          <a:lstStyle/>
+          <a:p>
+            <a:r>
+              <a:rPr lang="en-GB" dirty="0" smtClean="0"/>
+              <a:t>Common Tasks</a:t>
+            </a:r>
+            <a:endParaRPr lang="en-US" dirty="0"/>
+          </a:p>
+        </p:txBody>
+      </p:sp>
+      <p:sp>
+        <p:nvSpPr>
+          <p:cNvPr id="4" name="Content Placeholder 3"/>
+          <p:cNvSpPr>
+            <a:spLocks noGrp="1"/>
+          </p:cNvSpPr>
+          <p:nvPr>
+            <p:ph sz="quarter" idx="12"/>
+          </p:nvPr>
+        </p:nvSpPr>
+        <p:spPr/>
+        <p:txBody>
+          <a:bodyPr/>
+          <a:lstStyle/>
+          <a:p>
+            <a:pPr>
+              <a:lnSpc>
+                <a:spcPct val="150000"/>
+              </a:lnSpc>
+            </a:pPr>
+            <a:r>
+              <a:rPr lang="en-GB" sz="2400" dirty="0" smtClean="0"/>
+              <a:t>Architecture</a:t>
+            </a:r>
+            <a:endParaRPr lang="en-US" sz="2400" dirty="0" smtClean="0"/>
+          </a:p>
+          <a:p>
+            <a:pPr>
+              <a:lnSpc>
+                <a:spcPct val="150000"/>
+              </a:lnSpc>
+            </a:pPr>
+            <a:r>
+              <a:rPr lang="en-US" sz="2400" dirty="0" smtClean="0"/>
+              <a:t>Database</a:t>
+            </a:r>
+          </a:p>
+          <a:p>
+            <a:pPr>
+              <a:lnSpc>
+                <a:spcPct val="150000"/>
+              </a:lnSpc>
+            </a:pPr>
+            <a:r>
+              <a:rPr lang="en-US" sz="2400" dirty="0" smtClean="0"/>
+              <a:t>Jobs</a:t>
+            </a:r>
+          </a:p>
+          <a:p>
+            <a:pPr>
+              <a:lnSpc>
+                <a:spcPct val="150000"/>
+              </a:lnSpc>
+            </a:pPr>
+            <a:r>
+              <a:rPr lang="en-US" sz="2400" dirty="0" smtClean="0"/>
+              <a:t>API</a:t>
+            </a:r>
+          </a:p>
+          <a:p>
+            <a:pPr>
+              <a:lnSpc>
+                <a:spcPct val="150000"/>
+              </a:lnSpc>
+            </a:pPr>
+            <a:r>
+              <a:rPr lang="en-US" sz="2400" dirty="0" smtClean="0"/>
+              <a:t>Authentication</a:t>
+            </a:r>
+          </a:p>
+          <a:p>
+            <a:pPr>
+              <a:lnSpc>
+                <a:spcPct val="150000"/>
+              </a:lnSpc>
+            </a:pPr>
+            <a:r>
+              <a:rPr lang="en-US" sz="2400" dirty="0" smtClean="0"/>
+              <a:t>Sockets</a:t>
+            </a:r>
+          </a:p>
+          <a:p>
+            <a:pPr>
+              <a:lnSpc>
+                <a:spcPct val="150000"/>
+              </a:lnSpc>
+            </a:pPr>
+            <a:r>
+              <a:rPr lang="en-US" sz="2400" dirty="0" smtClean="0"/>
+              <a:t>Testing</a:t>
+            </a:r>
+          </a:p>
+        </p:txBody>
+      </p:sp>
+    </p:spTree>
+    <p:extLst>
+      <p:ext uri="{BB962C8B-B14F-4D97-AF65-F5344CB8AC3E}">
+        <p14:creationId xmlns:p14="http://schemas.microsoft.com/office/powerpoint/2010/main" val="839796294"/>
+      </p:ext>
+    </p:extLst>
+  </p:cSld>
+  <p:clrMapOvr>
+    <a:masterClrMapping/>
+  </p:clrMapOvr>
+</p:sld>
+</file>
+
+<file path=ppt/slides/slide7.xml><?xml version="1.0" encoding="utf-8"?>
+<p:sld xmlns:a="http://schemas.openxmlformats.org/drawingml/2006/main" xmlns:r="http://schemas.openxmlformats.org/officeDocument/2006/relationships" xmlns:p="http://schemas.openxmlformats.org/presentationml/2006/main">
+  <p:cSld>
+    <p:spTree>
+      <p:nvGrpSpPr>
+        <p:cNvPr id="1" name=""/>
+        <p:cNvGrpSpPr/>
+        <p:nvPr/>
+      </p:nvGrpSpPr>
+      <p:grpSpPr>
+        <a:xfrm>
+          <a:off x="0" y="0"/>
+          <a:ext cx="0" cy="0"/>
+          <a:chOff x="0" y="0"/>
+          <a:chExt cx="0" cy="0"/>
+        </a:xfrm>
+      </p:grpSpPr>
+      <p:sp>
+        <p:nvSpPr>
           <p:cNvPr id="2" name="Text Placeholder 1"/>
           <p:cNvSpPr>
             <a:spLocks noGrp="1"/>
@@ -24465,7 +25311,7 @@
 </p:sld>
 </file>
 
-<file path=ppt/slides/slide7.xml><?xml version="1.0" encoding="utf-8"?>
+<file path=ppt/slides/slide8.xml><?xml version="1.0" encoding="utf-8"?>
 <p:sld xmlns:a="http://schemas.openxmlformats.org/drawingml/2006/main" xmlns:r="http://schemas.openxmlformats.org/officeDocument/2006/relationships" xmlns:p="http://schemas.openxmlformats.org/presentationml/2006/main">
   <p:cSld>
     <p:spTree>
@@ -24543,7 +25389,7 @@
 </p:sld>
 </file>
 
-<file path=ppt/slides/slide8.xml><?xml version="1.0" encoding="utf-8"?>
+<file path=ppt/slides/slide9.xml><?xml version="1.0" encoding="utf-8"?>
 <p:sld xmlns:a="http://schemas.openxmlformats.org/drawingml/2006/main" xmlns:r="http://schemas.openxmlformats.org/officeDocument/2006/relationships" xmlns:p="http://schemas.openxmlformats.org/presentationml/2006/main">
   <p:cSld>
     <p:spTree>
@@ -24616,84 +25462,6 @@
     <p:extLst>
       <p:ext uri="{BB962C8B-B14F-4D97-AF65-F5344CB8AC3E}">
         <p14:creationId xmlns:p14="http://schemas.microsoft.com/office/powerpoint/2010/main" val="2536358613"/>
-      </p:ext>
-    </p:extLst>
-  </p:cSld>
-  <p:clrMapOvr>
-    <a:masterClrMapping/>
-  </p:clrMapOvr>
-</p:sld>
-</file>
-
-<file path=ppt/slides/slide9.xml><?xml version="1.0" encoding="utf-8"?>
-<p:sld xmlns:a="http://schemas.openxmlformats.org/drawingml/2006/main" xmlns:r="http://schemas.openxmlformats.org/officeDocument/2006/relationships" xmlns:p="http://schemas.openxmlformats.org/presentationml/2006/main">
-  <p:cSld>
-    <p:spTree>
-      <p:nvGrpSpPr>
-        <p:cNvPr id="1" name=""/>
-        <p:cNvGrpSpPr/>
-        <p:nvPr/>
-      </p:nvGrpSpPr>
-      <p:grpSpPr>
-        <a:xfrm>
-          <a:off x="0" y="0"/>
-          <a:ext cx="0" cy="0"/>
-          <a:chOff x="0" y="0"/>
-          <a:chExt cx="0" cy="0"/>
-        </a:xfrm>
-      </p:grpSpPr>
-      <p:sp>
-        <p:nvSpPr>
-          <p:cNvPr id="2" name="Title 1"/>
-          <p:cNvSpPr>
-            <a:spLocks noGrp="1"/>
-          </p:cNvSpPr>
-          <p:nvPr>
-            <p:ph type="title"/>
-          </p:nvPr>
-        </p:nvSpPr>
-        <p:spPr/>
-        <p:txBody>
-          <a:bodyPr/>
-          <a:lstStyle/>
-          <a:p>
-            <a:r>
-              <a:rPr lang="en-GB" dirty="0" smtClean="0"/>
-              <a:t>Further Development</a:t>
-            </a:r>
-            <a:endParaRPr lang="en-US" dirty="0"/>
-          </a:p>
-        </p:txBody>
-      </p:sp>
-      <p:graphicFrame>
-        <p:nvGraphicFramePr>
-          <p:cNvPr id="7" name="Content Placeholder 6"/>
-          <p:cNvGraphicFramePr>
-            <a:graphicFrameLocks noGrp="1"/>
-          </p:cNvGraphicFramePr>
-          <p:nvPr>
-            <p:ph sz="quarter" idx="12"/>
-            <p:extLst>
-              <p:ext uri="{D42A27DB-BD31-4B8C-83A1-F6EECF244321}">
-                <p14:modId xmlns:p14="http://schemas.microsoft.com/office/powerpoint/2010/main" val="2809844176"/>
-              </p:ext>
-            </p:extLst>
-          </p:nvPr>
-        </p:nvGraphicFramePr>
-        <p:xfrm>
-          <a:off x="323850" y="1341438"/>
-          <a:ext cx="8496300" cy="4895850"/>
-        </p:xfrm>
-        <a:graphic>
-          <a:graphicData uri="http://schemas.openxmlformats.org/drawingml/2006/chart">
-            <c:chart xmlns:c="http://schemas.openxmlformats.org/drawingml/2006/chart" xmlns:r="http://schemas.openxmlformats.org/officeDocument/2006/relationships" r:id="rId3"/>
-          </a:graphicData>
-        </a:graphic>
-      </p:graphicFrame>
-    </p:spTree>
-    <p:extLst>
-      <p:ext uri="{BB962C8B-B14F-4D97-AF65-F5344CB8AC3E}">
-        <p14:creationId xmlns:p14="http://schemas.microsoft.com/office/powerpoint/2010/main" val="2745616442"/>
       </p:ext>
     </p:extLst>
   </p:cSld>

</xml_diff>